<commit_message>
News updates - EdMatrix Discussion Groups
</commit_message>
<xml_diff>
--- a/_original_documents/Learning Standards Matrix.pptx
+++ b/_original_documents/Learning Standards Matrix.pptx
@@ -5,13 +5,17 @@
     <p:sldMasterId id="2147483648" r:id="rId1"/>
   </p:sldMasterIdLst>
   <p:notesMasterIdLst>
-    <p:notesMasterId r:id="rId6"/>
+    <p:notesMasterId r:id="rId10"/>
   </p:notesMasterIdLst>
   <p:sldIdLst>
     <p:sldId id="267" r:id="rId2"/>
     <p:sldId id="268" r:id="rId3"/>
     <p:sldId id="269" r:id="rId4"/>
     <p:sldId id="266" r:id="rId5"/>
+    <p:sldId id="270" r:id="rId6"/>
+    <p:sldId id="271" r:id="rId7"/>
+    <p:sldId id="272" r:id="rId8"/>
+    <p:sldId id="273" r:id="rId9"/>
   </p:sldIdLst>
   <p:sldSz cx="9144000" cy="6858000" type="screen4x3"/>
   <p:notesSz cx="6858000" cy="9144000"/>
@@ -1205,7 +1209,7 @@
           <a:p>
             <a:fld id="{9C9F9EC7-349F-459A-9F47-7E248F9FA12F}" type="datetimeFigureOut">
               <a:rPr lang="en-US" smtClean="0"/>
-              <a:t>2020-01-07</a:t>
+              <a:t>2021-12-16</a:t>
             </a:fld>
             <a:endParaRPr lang="en-US"/>
           </a:p>
@@ -1724,6 +1728,342 @@
 </p:notes>
 </file>
 
+<file path=ppt/notesSlides/notesSlide4.xml><?xml version="1.0" encoding="utf-8"?>
+<p:notes xmlns:a="http://schemas.openxmlformats.org/drawingml/2006/main" xmlns:r="http://schemas.openxmlformats.org/officeDocument/2006/relationships" xmlns:p="http://schemas.openxmlformats.org/presentationml/2006/main">
+  <p:cSld>
+    <p:spTree>
+      <p:nvGrpSpPr>
+        <p:cNvPr id="1" name=""/>
+        <p:cNvGrpSpPr/>
+        <p:nvPr/>
+      </p:nvGrpSpPr>
+      <p:grpSpPr>
+        <a:xfrm>
+          <a:off x="0" y="0"/>
+          <a:ext cx="0" cy="0"/>
+          <a:chOff x="0" y="0"/>
+          <a:chExt cx="0" cy="0"/>
+        </a:xfrm>
+      </p:grpSpPr>
+      <p:sp>
+        <p:nvSpPr>
+          <p:cNvPr id="2" name="Slide Image Placeholder 1"/>
+          <p:cNvSpPr>
+            <a:spLocks noGrp="1" noRot="1" noChangeAspect="1"/>
+          </p:cNvSpPr>
+          <p:nvPr>
+            <p:ph type="sldImg"/>
+          </p:nvPr>
+        </p:nvSpPr>
+        <p:spPr/>
+      </p:sp>
+      <p:sp>
+        <p:nvSpPr>
+          <p:cNvPr id="3" name="Notes Placeholder 2"/>
+          <p:cNvSpPr>
+            <a:spLocks noGrp="1"/>
+          </p:cNvSpPr>
+          <p:nvPr>
+            <p:ph type="body" idx="1"/>
+          </p:nvPr>
+        </p:nvSpPr>
+        <p:spPr/>
+        <p:txBody>
+          <a:bodyPr/>
+          <a:lstStyle/>
+          <a:p>
+            <a:endParaRPr lang="en-US" dirty="0"/>
+          </a:p>
+        </p:txBody>
+      </p:sp>
+      <p:sp>
+        <p:nvSpPr>
+          <p:cNvPr id="4" name="Slide Number Placeholder 3"/>
+          <p:cNvSpPr>
+            <a:spLocks noGrp="1"/>
+          </p:cNvSpPr>
+          <p:nvPr>
+            <p:ph type="sldNum" sz="quarter" idx="10"/>
+          </p:nvPr>
+        </p:nvSpPr>
+        <p:spPr/>
+        <p:txBody>
+          <a:bodyPr/>
+          <a:lstStyle/>
+          <a:p>
+            <a:fld id="{EAF55101-EEB9-4B4E-9527-9E942F38658C}" type="slidenum">
+              <a:rPr lang="en-US" smtClean="0"/>
+              <a:t>5</a:t>
+            </a:fld>
+            <a:endParaRPr lang="en-US"/>
+          </a:p>
+        </p:txBody>
+      </p:sp>
+    </p:spTree>
+    <p:extLst>
+      <p:ext uri="{BB962C8B-B14F-4D97-AF65-F5344CB8AC3E}">
+        <p14:creationId xmlns:p14="http://schemas.microsoft.com/office/powerpoint/2010/main" val="2442993140"/>
+      </p:ext>
+    </p:extLst>
+  </p:cSld>
+  <p:clrMapOvr>
+    <a:masterClrMapping/>
+  </p:clrMapOvr>
+</p:notes>
+</file>
+
+<file path=ppt/notesSlides/notesSlide5.xml><?xml version="1.0" encoding="utf-8"?>
+<p:notes xmlns:a="http://schemas.openxmlformats.org/drawingml/2006/main" xmlns:r="http://schemas.openxmlformats.org/officeDocument/2006/relationships" xmlns:p="http://schemas.openxmlformats.org/presentationml/2006/main">
+  <p:cSld>
+    <p:spTree>
+      <p:nvGrpSpPr>
+        <p:cNvPr id="1" name=""/>
+        <p:cNvGrpSpPr/>
+        <p:nvPr/>
+      </p:nvGrpSpPr>
+      <p:grpSpPr>
+        <a:xfrm>
+          <a:off x="0" y="0"/>
+          <a:ext cx="0" cy="0"/>
+          <a:chOff x="0" y="0"/>
+          <a:chExt cx="0" cy="0"/>
+        </a:xfrm>
+      </p:grpSpPr>
+      <p:sp>
+        <p:nvSpPr>
+          <p:cNvPr id="2" name="Slide Image Placeholder 1"/>
+          <p:cNvSpPr>
+            <a:spLocks noGrp="1" noRot="1" noChangeAspect="1"/>
+          </p:cNvSpPr>
+          <p:nvPr>
+            <p:ph type="sldImg"/>
+          </p:nvPr>
+        </p:nvSpPr>
+        <p:spPr/>
+      </p:sp>
+      <p:sp>
+        <p:nvSpPr>
+          <p:cNvPr id="3" name="Notes Placeholder 2"/>
+          <p:cNvSpPr>
+            <a:spLocks noGrp="1"/>
+          </p:cNvSpPr>
+          <p:nvPr>
+            <p:ph type="body" idx="1"/>
+          </p:nvPr>
+        </p:nvSpPr>
+        <p:spPr/>
+        <p:txBody>
+          <a:bodyPr/>
+          <a:lstStyle/>
+          <a:p>
+            <a:endParaRPr lang="en-US" dirty="0"/>
+          </a:p>
+        </p:txBody>
+      </p:sp>
+      <p:sp>
+        <p:nvSpPr>
+          <p:cNvPr id="4" name="Slide Number Placeholder 3"/>
+          <p:cNvSpPr>
+            <a:spLocks noGrp="1"/>
+          </p:cNvSpPr>
+          <p:nvPr>
+            <p:ph type="sldNum" sz="quarter" idx="10"/>
+          </p:nvPr>
+        </p:nvSpPr>
+        <p:spPr/>
+        <p:txBody>
+          <a:bodyPr/>
+          <a:lstStyle/>
+          <a:p>
+            <a:fld id="{EAF55101-EEB9-4B4E-9527-9E942F38658C}" type="slidenum">
+              <a:rPr lang="en-US" smtClean="0"/>
+              <a:t>6</a:t>
+            </a:fld>
+            <a:endParaRPr lang="en-US"/>
+          </a:p>
+        </p:txBody>
+      </p:sp>
+    </p:spTree>
+    <p:extLst>
+      <p:ext uri="{BB962C8B-B14F-4D97-AF65-F5344CB8AC3E}">
+        <p14:creationId xmlns:p14="http://schemas.microsoft.com/office/powerpoint/2010/main" val="963801060"/>
+      </p:ext>
+    </p:extLst>
+  </p:cSld>
+  <p:clrMapOvr>
+    <a:masterClrMapping/>
+  </p:clrMapOvr>
+</p:notes>
+</file>
+
+<file path=ppt/notesSlides/notesSlide6.xml><?xml version="1.0" encoding="utf-8"?>
+<p:notes xmlns:a="http://schemas.openxmlformats.org/drawingml/2006/main" xmlns:r="http://schemas.openxmlformats.org/officeDocument/2006/relationships" xmlns:p="http://schemas.openxmlformats.org/presentationml/2006/main">
+  <p:cSld>
+    <p:spTree>
+      <p:nvGrpSpPr>
+        <p:cNvPr id="1" name=""/>
+        <p:cNvGrpSpPr/>
+        <p:nvPr/>
+      </p:nvGrpSpPr>
+      <p:grpSpPr>
+        <a:xfrm>
+          <a:off x="0" y="0"/>
+          <a:ext cx="0" cy="0"/>
+          <a:chOff x="0" y="0"/>
+          <a:chExt cx="0" cy="0"/>
+        </a:xfrm>
+      </p:grpSpPr>
+      <p:sp>
+        <p:nvSpPr>
+          <p:cNvPr id="2" name="Slide Image Placeholder 1"/>
+          <p:cNvSpPr>
+            <a:spLocks noGrp="1" noRot="1" noChangeAspect="1"/>
+          </p:cNvSpPr>
+          <p:nvPr>
+            <p:ph type="sldImg"/>
+          </p:nvPr>
+        </p:nvSpPr>
+        <p:spPr/>
+      </p:sp>
+      <p:sp>
+        <p:nvSpPr>
+          <p:cNvPr id="3" name="Notes Placeholder 2"/>
+          <p:cNvSpPr>
+            <a:spLocks noGrp="1"/>
+          </p:cNvSpPr>
+          <p:nvPr>
+            <p:ph type="body" idx="1"/>
+          </p:nvPr>
+        </p:nvSpPr>
+        <p:spPr/>
+        <p:txBody>
+          <a:bodyPr/>
+          <a:lstStyle/>
+          <a:p>
+            <a:endParaRPr lang="en-US" dirty="0"/>
+          </a:p>
+        </p:txBody>
+      </p:sp>
+      <p:sp>
+        <p:nvSpPr>
+          <p:cNvPr id="4" name="Slide Number Placeholder 3"/>
+          <p:cNvSpPr>
+            <a:spLocks noGrp="1"/>
+          </p:cNvSpPr>
+          <p:nvPr>
+            <p:ph type="sldNum" sz="quarter" idx="10"/>
+          </p:nvPr>
+        </p:nvSpPr>
+        <p:spPr/>
+        <p:txBody>
+          <a:bodyPr/>
+          <a:lstStyle/>
+          <a:p>
+            <a:fld id="{EAF55101-EEB9-4B4E-9527-9E942F38658C}" type="slidenum">
+              <a:rPr lang="en-US" smtClean="0"/>
+              <a:t>7</a:t>
+            </a:fld>
+            <a:endParaRPr lang="en-US"/>
+          </a:p>
+        </p:txBody>
+      </p:sp>
+    </p:spTree>
+    <p:extLst>
+      <p:ext uri="{BB962C8B-B14F-4D97-AF65-F5344CB8AC3E}">
+        <p14:creationId xmlns:p14="http://schemas.microsoft.com/office/powerpoint/2010/main" val="1351613172"/>
+      </p:ext>
+    </p:extLst>
+  </p:cSld>
+  <p:clrMapOvr>
+    <a:masterClrMapping/>
+  </p:clrMapOvr>
+</p:notes>
+</file>
+
+<file path=ppt/notesSlides/notesSlide7.xml><?xml version="1.0" encoding="utf-8"?>
+<p:notes xmlns:a="http://schemas.openxmlformats.org/drawingml/2006/main" xmlns:r="http://schemas.openxmlformats.org/officeDocument/2006/relationships" xmlns:p="http://schemas.openxmlformats.org/presentationml/2006/main">
+  <p:cSld>
+    <p:spTree>
+      <p:nvGrpSpPr>
+        <p:cNvPr id="1" name=""/>
+        <p:cNvGrpSpPr/>
+        <p:nvPr/>
+      </p:nvGrpSpPr>
+      <p:grpSpPr>
+        <a:xfrm>
+          <a:off x="0" y="0"/>
+          <a:ext cx="0" cy="0"/>
+          <a:chOff x="0" y="0"/>
+          <a:chExt cx="0" cy="0"/>
+        </a:xfrm>
+      </p:grpSpPr>
+      <p:sp>
+        <p:nvSpPr>
+          <p:cNvPr id="2" name="Slide Image Placeholder 1"/>
+          <p:cNvSpPr>
+            <a:spLocks noGrp="1" noRot="1" noChangeAspect="1"/>
+          </p:cNvSpPr>
+          <p:nvPr>
+            <p:ph type="sldImg"/>
+          </p:nvPr>
+        </p:nvSpPr>
+        <p:spPr/>
+      </p:sp>
+      <p:sp>
+        <p:nvSpPr>
+          <p:cNvPr id="3" name="Notes Placeholder 2"/>
+          <p:cNvSpPr>
+            <a:spLocks noGrp="1"/>
+          </p:cNvSpPr>
+          <p:nvPr>
+            <p:ph type="body" idx="1"/>
+          </p:nvPr>
+        </p:nvSpPr>
+        <p:spPr/>
+        <p:txBody>
+          <a:bodyPr/>
+          <a:lstStyle/>
+          <a:p>
+            <a:endParaRPr lang="en-US" dirty="0"/>
+          </a:p>
+        </p:txBody>
+      </p:sp>
+      <p:sp>
+        <p:nvSpPr>
+          <p:cNvPr id="4" name="Slide Number Placeholder 3"/>
+          <p:cNvSpPr>
+            <a:spLocks noGrp="1"/>
+          </p:cNvSpPr>
+          <p:nvPr>
+            <p:ph type="sldNum" sz="quarter" idx="10"/>
+          </p:nvPr>
+        </p:nvSpPr>
+        <p:spPr/>
+        <p:txBody>
+          <a:bodyPr/>
+          <a:lstStyle/>
+          <a:p>
+            <a:fld id="{EAF55101-EEB9-4B4E-9527-9E942F38658C}" type="slidenum">
+              <a:rPr lang="en-US" smtClean="0"/>
+              <a:t>8</a:t>
+            </a:fld>
+            <a:endParaRPr lang="en-US"/>
+          </a:p>
+        </p:txBody>
+      </p:sp>
+    </p:spTree>
+    <p:extLst>
+      <p:ext uri="{BB962C8B-B14F-4D97-AF65-F5344CB8AC3E}">
+        <p14:creationId xmlns:p14="http://schemas.microsoft.com/office/powerpoint/2010/main" val="546862380"/>
+      </p:ext>
+    </p:extLst>
+  </p:cSld>
+  <p:clrMapOvr>
+    <a:masterClrMapping/>
+  </p:clrMapOvr>
+</p:notes>
+</file>
+
 <file path=ppt/slideLayouts/slideLayout1.xml><?xml version="1.0" encoding="utf-8"?>
 <p:sldLayout xmlns:a="http://schemas.openxmlformats.org/drawingml/2006/main" xmlns:r="http://schemas.openxmlformats.org/officeDocument/2006/relationships" xmlns:p="http://schemas.openxmlformats.org/presentationml/2006/main" type="title" preserve="1">
   <p:cSld name="Title Slide">
@@ -1903,7 +2243,7 @@
           <a:p>
             <a:fld id="{99F55C7B-28FE-444C-ADB6-C5B890F92BAD}" type="datetimeFigureOut">
               <a:rPr lang="en-US" smtClean="0"/>
-              <a:t>2020-01-07</a:t>
+              <a:t>2021-12-16</a:t>
             </a:fld>
             <a:endParaRPr lang="en-US"/>
           </a:p>
@@ -2071,7 +2411,7 @@
           <a:p>
             <a:fld id="{99F55C7B-28FE-444C-ADB6-C5B890F92BAD}" type="datetimeFigureOut">
               <a:rPr lang="en-US" smtClean="0"/>
-              <a:t>2020-01-07</a:t>
+              <a:t>2021-12-16</a:t>
             </a:fld>
             <a:endParaRPr lang="en-US"/>
           </a:p>
@@ -2249,7 +2589,7 @@
           <a:p>
             <a:fld id="{99F55C7B-28FE-444C-ADB6-C5B890F92BAD}" type="datetimeFigureOut">
               <a:rPr lang="en-US" smtClean="0"/>
-              <a:t>2020-01-07</a:t>
+              <a:t>2021-12-16</a:t>
             </a:fld>
             <a:endParaRPr lang="en-US"/>
           </a:p>
@@ -2417,7 +2757,7 @@
           <a:p>
             <a:fld id="{99F55C7B-28FE-444C-ADB6-C5B890F92BAD}" type="datetimeFigureOut">
               <a:rPr lang="en-US" smtClean="0"/>
-              <a:t>2020-01-07</a:t>
+              <a:t>2021-12-16</a:t>
             </a:fld>
             <a:endParaRPr lang="en-US"/>
           </a:p>
@@ -2662,7 +3002,7 @@
           <a:p>
             <a:fld id="{99F55C7B-28FE-444C-ADB6-C5B890F92BAD}" type="datetimeFigureOut">
               <a:rPr lang="en-US" smtClean="0"/>
-              <a:t>2020-01-07</a:t>
+              <a:t>2021-12-16</a:t>
             </a:fld>
             <a:endParaRPr lang="en-US"/>
           </a:p>
@@ -2947,7 +3287,7 @@
           <a:p>
             <a:fld id="{99F55C7B-28FE-444C-ADB6-C5B890F92BAD}" type="datetimeFigureOut">
               <a:rPr lang="en-US" smtClean="0"/>
-              <a:t>2020-01-07</a:t>
+              <a:t>2021-12-16</a:t>
             </a:fld>
             <a:endParaRPr lang="en-US"/>
           </a:p>
@@ -3366,7 +3706,7 @@
           <a:p>
             <a:fld id="{99F55C7B-28FE-444C-ADB6-C5B890F92BAD}" type="datetimeFigureOut">
               <a:rPr lang="en-US" smtClean="0"/>
-              <a:t>2020-01-07</a:t>
+              <a:t>2021-12-16</a:t>
             </a:fld>
             <a:endParaRPr lang="en-US"/>
           </a:p>
@@ -3483,7 +3823,7 @@
           <a:p>
             <a:fld id="{99F55C7B-28FE-444C-ADB6-C5B890F92BAD}" type="datetimeFigureOut">
               <a:rPr lang="en-US" smtClean="0"/>
-              <a:t>2020-01-07</a:t>
+              <a:t>2021-12-16</a:t>
             </a:fld>
             <a:endParaRPr lang="en-US"/>
           </a:p>
@@ -3578,7 +3918,7 @@
           <a:p>
             <a:fld id="{99F55C7B-28FE-444C-ADB6-C5B890F92BAD}" type="datetimeFigureOut">
               <a:rPr lang="en-US" smtClean="0"/>
-              <a:t>2020-01-07</a:t>
+              <a:t>2021-12-16</a:t>
             </a:fld>
             <a:endParaRPr lang="en-US"/>
           </a:p>
@@ -3853,7 +4193,7 @@
           <a:p>
             <a:fld id="{99F55C7B-28FE-444C-ADB6-C5B890F92BAD}" type="datetimeFigureOut">
               <a:rPr lang="en-US" smtClean="0"/>
-              <a:t>2020-01-07</a:t>
+              <a:t>2021-12-16</a:t>
             </a:fld>
             <a:endParaRPr lang="en-US"/>
           </a:p>
@@ -4105,7 +4445,7 @@
           <a:p>
             <a:fld id="{99F55C7B-28FE-444C-ADB6-C5B890F92BAD}" type="datetimeFigureOut">
               <a:rPr lang="en-US" smtClean="0"/>
-              <a:t>2020-01-07</a:t>
+              <a:t>2021-12-16</a:t>
             </a:fld>
             <a:endParaRPr lang="en-US"/>
           </a:p>
@@ -4316,7 +4656,7 @@
           <a:p>
             <a:fld id="{99F55C7B-28FE-444C-ADB6-C5B890F92BAD}" type="datetimeFigureOut">
               <a:rPr lang="en-US" smtClean="0"/>
-              <a:t>2020-01-07</a:t>
+              <a:t>2021-12-16</a:t>
             </a:fld>
             <a:endParaRPr lang="en-US"/>
           </a:p>
@@ -10138,7 +10478,7 @@
         </p:nvSpPr>
         <p:spPr>
           <a:xfrm>
-            <a:off x="4724400" y="4876800"/>
+            <a:off x="4719320" y="4886960"/>
             <a:ext cx="2286000" cy="228600"/>
           </a:xfrm>
           <a:prstGeom prst="roundRect">
@@ -12595,6 +12935,4038 @@
     <p:extLst>
       <p:ext uri="{BB962C8B-B14F-4D97-AF65-F5344CB8AC3E}">
         <p14:creationId xmlns:p14="http://schemas.microsoft.com/office/powerpoint/2010/main" val="3411993058"/>
+      </p:ext>
+    </p:extLst>
+  </p:cSld>
+  <p:clrMapOvr>
+    <a:masterClrMapping/>
+  </p:clrMapOvr>
+</p:sld>
+</file>
+
+<file path=ppt/slides/slide5.xml><?xml version="1.0" encoding="utf-8"?>
+<p:sld xmlns:a="http://schemas.openxmlformats.org/drawingml/2006/main" xmlns:r="http://schemas.openxmlformats.org/officeDocument/2006/relationships" xmlns:p="http://schemas.openxmlformats.org/presentationml/2006/main">
+  <p:cSld>
+    <p:spTree>
+      <p:nvGrpSpPr>
+        <p:cNvPr id="1" name=""/>
+        <p:cNvGrpSpPr/>
+        <p:nvPr/>
+      </p:nvGrpSpPr>
+      <p:grpSpPr>
+        <a:xfrm>
+          <a:off x="0" y="0"/>
+          <a:ext cx="0" cy="0"/>
+          <a:chOff x="0" y="0"/>
+          <a:chExt cx="0" cy="0"/>
+        </a:xfrm>
+      </p:grpSpPr>
+      <p:sp>
+        <p:nvSpPr>
+          <p:cNvPr id="77" name="Rectangle 76">
+            <a:extLst>
+              <a:ext uri="{FF2B5EF4-FFF2-40B4-BE49-F238E27FC236}">
+                <a16:creationId xmlns:a16="http://schemas.microsoft.com/office/drawing/2014/main" id="{33E03DD4-58B8-4D84-81B8-890E74C1E17A}"/>
+              </a:ext>
+            </a:extLst>
+          </p:cNvPr>
+          <p:cNvSpPr/>
+          <p:nvPr/>
+        </p:nvSpPr>
+        <p:spPr>
+          <a:xfrm>
+            <a:off x="1295400" y="1524000"/>
+            <a:ext cx="381000" cy="1676400"/>
+          </a:xfrm>
+          <a:prstGeom prst="rect">
+            <a:avLst/>
+          </a:prstGeom>
+          <a:solidFill>
+            <a:srgbClr val="B0C6E1"/>
+          </a:solidFill>
+          <a:ln w="12700">
+            <a:noFill/>
+          </a:ln>
+        </p:spPr>
+        <p:style>
+          <a:lnRef idx="2">
+            <a:schemeClr val="accent1">
+              <a:shade val="50000"/>
+            </a:schemeClr>
+          </a:lnRef>
+          <a:fillRef idx="1">
+            <a:schemeClr val="accent1"/>
+          </a:fillRef>
+          <a:effectRef idx="0">
+            <a:schemeClr val="accent1"/>
+          </a:effectRef>
+          <a:fontRef idx="minor">
+            <a:schemeClr val="lt1"/>
+          </a:fontRef>
+        </p:style>
+        <p:txBody>
+          <a:bodyPr rtlCol="0" anchor="ctr"/>
+          <a:lstStyle/>
+          <a:p>
+            <a:endParaRPr lang="en-US">
+              <a:solidFill>
+                <a:srgbClr val="000000"/>
+              </a:solidFill>
+            </a:endParaRPr>
+          </a:p>
+        </p:txBody>
+      </p:sp>
+      <p:sp>
+        <p:nvSpPr>
+          <p:cNvPr id="78" name="Rectangle 77">
+            <a:extLst>
+              <a:ext uri="{FF2B5EF4-FFF2-40B4-BE49-F238E27FC236}">
+                <a16:creationId xmlns:a16="http://schemas.microsoft.com/office/drawing/2014/main" id="{5A6BABA4-FFD3-46EC-8366-B18DEE47420B}"/>
+              </a:ext>
+            </a:extLst>
+          </p:cNvPr>
+          <p:cNvSpPr/>
+          <p:nvPr/>
+        </p:nvSpPr>
+        <p:spPr>
+          <a:xfrm>
+            <a:off x="1295400" y="3581400"/>
+            <a:ext cx="381000" cy="1676400"/>
+          </a:xfrm>
+          <a:prstGeom prst="rect">
+            <a:avLst/>
+          </a:prstGeom>
+          <a:solidFill>
+            <a:srgbClr val="B0C6E1"/>
+          </a:solidFill>
+          <a:ln w="12700">
+            <a:noFill/>
+          </a:ln>
+        </p:spPr>
+        <p:style>
+          <a:lnRef idx="2">
+            <a:schemeClr val="accent1">
+              <a:shade val="50000"/>
+            </a:schemeClr>
+          </a:lnRef>
+          <a:fillRef idx="1">
+            <a:schemeClr val="accent1"/>
+          </a:fillRef>
+          <a:effectRef idx="0">
+            <a:schemeClr val="accent1"/>
+          </a:effectRef>
+          <a:fontRef idx="minor">
+            <a:schemeClr val="lt1"/>
+          </a:fontRef>
+        </p:style>
+        <p:txBody>
+          <a:bodyPr rtlCol="0" anchor="ctr"/>
+          <a:lstStyle/>
+          <a:p>
+            <a:endParaRPr lang="en-US">
+              <a:solidFill>
+                <a:srgbClr val="000000"/>
+              </a:solidFill>
+            </a:endParaRPr>
+          </a:p>
+        </p:txBody>
+      </p:sp>
+      <p:sp>
+        <p:nvSpPr>
+          <p:cNvPr id="79" name="Rectangle 78">
+            <a:extLst>
+              <a:ext uri="{FF2B5EF4-FFF2-40B4-BE49-F238E27FC236}">
+                <a16:creationId xmlns:a16="http://schemas.microsoft.com/office/drawing/2014/main" id="{3D5629A0-55CD-4EEB-BE29-B63359C7AC5A}"/>
+              </a:ext>
+            </a:extLst>
+          </p:cNvPr>
+          <p:cNvSpPr/>
+          <p:nvPr/>
+        </p:nvSpPr>
+        <p:spPr>
+          <a:xfrm>
+            <a:off x="533400" y="1905000"/>
+            <a:ext cx="381000" cy="4038600"/>
+          </a:xfrm>
+          <a:prstGeom prst="rect">
+            <a:avLst/>
+          </a:prstGeom>
+          <a:solidFill>
+            <a:srgbClr val="B0C6E1"/>
+          </a:solidFill>
+          <a:ln w="12700">
+            <a:noFill/>
+          </a:ln>
+        </p:spPr>
+        <p:style>
+          <a:lnRef idx="2">
+            <a:schemeClr val="accent1">
+              <a:shade val="50000"/>
+            </a:schemeClr>
+          </a:lnRef>
+          <a:fillRef idx="1">
+            <a:schemeClr val="accent1"/>
+          </a:fillRef>
+          <a:effectRef idx="0">
+            <a:schemeClr val="accent1"/>
+          </a:effectRef>
+          <a:fontRef idx="minor">
+            <a:schemeClr val="lt1"/>
+          </a:fontRef>
+        </p:style>
+        <p:txBody>
+          <a:bodyPr rtlCol="0" anchor="ctr"/>
+          <a:lstStyle/>
+          <a:p>
+            <a:endParaRPr lang="en-US">
+              <a:solidFill>
+                <a:srgbClr val="000000"/>
+              </a:solidFill>
+            </a:endParaRPr>
+          </a:p>
+        </p:txBody>
+      </p:sp>
+      <p:sp>
+        <p:nvSpPr>
+          <p:cNvPr id="80" name="Rectangle 79">
+            <a:extLst>
+              <a:ext uri="{FF2B5EF4-FFF2-40B4-BE49-F238E27FC236}">
+                <a16:creationId xmlns:a16="http://schemas.microsoft.com/office/drawing/2014/main" id="{1EB438D2-118B-4AC7-8396-17EF60C6CA43}"/>
+              </a:ext>
+            </a:extLst>
+          </p:cNvPr>
+          <p:cNvSpPr/>
+          <p:nvPr/>
+        </p:nvSpPr>
+        <p:spPr>
+          <a:xfrm>
+            <a:off x="76200" y="3048000"/>
+            <a:ext cx="1143000" cy="685800"/>
+          </a:xfrm>
+          <a:prstGeom prst="rect">
+            <a:avLst/>
+          </a:prstGeom>
+          <a:solidFill>
+            <a:srgbClr val="B0C6E1"/>
+          </a:solidFill>
+          <a:ln w="12700">
+            <a:noFill/>
+          </a:ln>
+        </p:spPr>
+        <p:style>
+          <a:lnRef idx="2">
+            <a:schemeClr val="accent1">
+              <a:shade val="50000"/>
+            </a:schemeClr>
+          </a:lnRef>
+          <a:fillRef idx="1">
+            <a:schemeClr val="accent1"/>
+          </a:fillRef>
+          <a:effectRef idx="0">
+            <a:schemeClr val="accent1"/>
+          </a:effectRef>
+          <a:fontRef idx="minor">
+            <a:schemeClr val="lt1"/>
+          </a:fontRef>
+        </p:style>
+        <p:txBody>
+          <a:bodyPr rtlCol="0" anchor="ctr"/>
+          <a:lstStyle/>
+          <a:p>
+            <a:endParaRPr lang="en-US" dirty="0">
+              <a:solidFill>
+                <a:srgbClr val="000000"/>
+              </a:solidFill>
+            </a:endParaRPr>
+          </a:p>
+        </p:txBody>
+      </p:sp>
+      <p:sp>
+        <p:nvSpPr>
+          <p:cNvPr id="64" name="Rectangle 63">
+            <a:extLst>
+              <a:ext uri="{FF2B5EF4-FFF2-40B4-BE49-F238E27FC236}">
+                <a16:creationId xmlns:a16="http://schemas.microsoft.com/office/drawing/2014/main" id="{7A9FA661-12AD-47BA-95C7-6CA9D6C2B43D}"/>
+              </a:ext>
+            </a:extLst>
+          </p:cNvPr>
+          <p:cNvSpPr/>
+          <p:nvPr/>
+        </p:nvSpPr>
+        <p:spPr>
+          <a:xfrm>
+            <a:off x="533400" y="1866900"/>
+            <a:ext cx="2019300" cy="304800"/>
+          </a:xfrm>
+          <a:prstGeom prst="rect">
+            <a:avLst/>
+          </a:prstGeom>
+          <a:solidFill>
+            <a:srgbClr val="B0C6E1"/>
+          </a:solidFill>
+          <a:ln w="12700">
+            <a:noFill/>
+          </a:ln>
+        </p:spPr>
+        <p:style>
+          <a:lnRef idx="2">
+            <a:schemeClr val="accent1">
+              <a:shade val="50000"/>
+            </a:schemeClr>
+          </a:lnRef>
+          <a:fillRef idx="1">
+            <a:schemeClr val="accent1"/>
+          </a:fillRef>
+          <a:effectRef idx="0">
+            <a:schemeClr val="accent1"/>
+          </a:effectRef>
+          <a:fontRef idx="minor">
+            <a:schemeClr val="lt1"/>
+          </a:fontRef>
+        </p:style>
+        <p:txBody>
+          <a:bodyPr rtlCol="0" anchor="ctr"/>
+          <a:lstStyle/>
+          <a:p>
+            <a:endParaRPr lang="en-US" dirty="0">
+              <a:solidFill>
+                <a:srgbClr val="000000"/>
+              </a:solidFill>
+            </a:endParaRPr>
+          </a:p>
+        </p:txBody>
+      </p:sp>
+      <p:sp>
+        <p:nvSpPr>
+          <p:cNvPr id="76" name="Rectangle 75">
+            <a:extLst>
+              <a:ext uri="{FF2B5EF4-FFF2-40B4-BE49-F238E27FC236}">
+                <a16:creationId xmlns:a16="http://schemas.microsoft.com/office/drawing/2014/main" id="{43EF6C0C-AB74-462D-BC92-578F345D5EB7}"/>
+              </a:ext>
+            </a:extLst>
+          </p:cNvPr>
+          <p:cNvSpPr/>
+          <p:nvPr/>
+        </p:nvSpPr>
+        <p:spPr>
+          <a:xfrm>
+            <a:off x="533400" y="3924300"/>
+            <a:ext cx="2019300" cy="304800"/>
+          </a:xfrm>
+          <a:prstGeom prst="rect">
+            <a:avLst/>
+          </a:prstGeom>
+          <a:solidFill>
+            <a:srgbClr val="B0C6E1"/>
+          </a:solidFill>
+          <a:ln w="12700">
+            <a:noFill/>
+          </a:ln>
+        </p:spPr>
+        <p:style>
+          <a:lnRef idx="2">
+            <a:schemeClr val="accent1">
+              <a:shade val="50000"/>
+            </a:schemeClr>
+          </a:lnRef>
+          <a:fillRef idx="1">
+            <a:schemeClr val="accent1"/>
+          </a:fillRef>
+          <a:effectRef idx="0">
+            <a:schemeClr val="accent1"/>
+          </a:effectRef>
+          <a:fontRef idx="minor">
+            <a:schemeClr val="lt1"/>
+          </a:fontRef>
+        </p:style>
+        <p:txBody>
+          <a:bodyPr rtlCol="0" anchor="ctr"/>
+          <a:lstStyle/>
+          <a:p>
+            <a:endParaRPr lang="en-US" dirty="0">
+              <a:solidFill>
+                <a:srgbClr val="000000"/>
+              </a:solidFill>
+            </a:endParaRPr>
+          </a:p>
+        </p:txBody>
+      </p:sp>
+      <p:sp>
+        <p:nvSpPr>
+          <p:cNvPr id="52" name="Rectangle 51">
+            <a:extLst>
+              <a:ext uri="{FF2B5EF4-FFF2-40B4-BE49-F238E27FC236}">
+                <a16:creationId xmlns:a16="http://schemas.microsoft.com/office/drawing/2014/main" id="{B1123211-0A47-43F4-B5D5-3C9F0EF3D0E2}"/>
+              </a:ext>
+            </a:extLst>
+          </p:cNvPr>
+          <p:cNvSpPr/>
+          <p:nvPr/>
+        </p:nvSpPr>
+        <p:spPr>
+          <a:xfrm>
+            <a:off x="533400" y="5638800"/>
+            <a:ext cx="8305800" cy="304800"/>
+          </a:xfrm>
+          <a:prstGeom prst="rect">
+            <a:avLst/>
+          </a:prstGeom>
+          <a:solidFill>
+            <a:srgbClr val="B0C6E1"/>
+          </a:solidFill>
+          <a:ln w="12700">
+            <a:noFill/>
+          </a:ln>
+        </p:spPr>
+        <p:style>
+          <a:lnRef idx="2">
+            <a:schemeClr val="accent1">
+              <a:shade val="50000"/>
+            </a:schemeClr>
+          </a:lnRef>
+          <a:fillRef idx="1">
+            <a:schemeClr val="accent1"/>
+          </a:fillRef>
+          <a:effectRef idx="0">
+            <a:schemeClr val="accent1"/>
+          </a:effectRef>
+          <a:fontRef idx="minor">
+            <a:schemeClr val="lt1"/>
+          </a:fontRef>
+        </p:style>
+        <p:txBody>
+          <a:bodyPr rtlCol="0" anchor="ctr"/>
+          <a:lstStyle/>
+          <a:p>
+            <a:endParaRPr lang="en-US" dirty="0">
+              <a:solidFill>
+                <a:srgbClr val="000000"/>
+              </a:solidFill>
+            </a:endParaRPr>
+          </a:p>
+        </p:txBody>
+      </p:sp>
+      <p:sp>
+        <p:nvSpPr>
+          <p:cNvPr id="5" name="Rectangle 4">
+            <a:extLst>
+              <a:ext uri="{FF2B5EF4-FFF2-40B4-BE49-F238E27FC236}">
+                <a16:creationId xmlns:a16="http://schemas.microsoft.com/office/drawing/2014/main" id="{C6706F1E-6D81-4DF0-9BC7-A7D48695D99C}"/>
+              </a:ext>
+            </a:extLst>
+          </p:cNvPr>
+          <p:cNvSpPr/>
+          <p:nvPr/>
+        </p:nvSpPr>
+        <p:spPr>
+          <a:xfrm>
+            <a:off x="1295400" y="1524000"/>
+            <a:ext cx="7543800" cy="304800"/>
+          </a:xfrm>
+          <a:prstGeom prst="rect">
+            <a:avLst/>
+          </a:prstGeom>
+          <a:solidFill>
+            <a:srgbClr val="B0C6E1"/>
+          </a:solidFill>
+          <a:ln w="12700">
+            <a:noFill/>
+          </a:ln>
+        </p:spPr>
+        <p:style>
+          <a:lnRef idx="2">
+            <a:schemeClr val="accent1">
+              <a:shade val="50000"/>
+            </a:schemeClr>
+          </a:lnRef>
+          <a:fillRef idx="1">
+            <a:schemeClr val="accent1"/>
+          </a:fillRef>
+          <a:effectRef idx="0">
+            <a:schemeClr val="accent1"/>
+          </a:effectRef>
+          <a:fontRef idx="minor">
+            <a:schemeClr val="lt1"/>
+          </a:fontRef>
+        </p:style>
+        <p:txBody>
+          <a:bodyPr rtlCol="0" anchor="ctr"/>
+          <a:lstStyle/>
+          <a:p>
+            <a:endParaRPr lang="en-US" dirty="0">
+              <a:solidFill>
+                <a:srgbClr val="000000"/>
+              </a:solidFill>
+            </a:endParaRPr>
+          </a:p>
+        </p:txBody>
+      </p:sp>
+      <p:sp>
+        <p:nvSpPr>
+          <p:cNvPr id="47" name="Rectangle 46">
+            <a:extLst>
+              <a:ext uri="{FF2B5EF4-FFF2-40B4-BE49-F238E27FC236}">
+                <a16:creationId xmlns:a16="http://schemas.microsoft.com/office/drawing/2014/main" id="{D13E14B6-C5F9-4921-B47A-A713D13FD3B7}"/>
+              </a:ext>
+            </a:extLst>
+          </p:cNvPr>
+          <p:cNvSpPr/>
+          <p:nvPr/>
+        </p:nvSpPr>
+        <p:spPr>
+          <a:xfrm>
+            <a:off x="1295400" y="2209800"/>
+            <a:ext cx="7543800" cy="304800"/>
+          </a:xfrm>
+          <a:prstGeom prst="rect">
+            <a:avLst/>
+          </a:prstGeom>
+          <a:solidFill>
+            <a:srgbClr val="B0C6E1"/>
+          </a:solidFill>
+          <a:ln w="12700">
+            <a:noFill/>
+          </a:ln>
+        </p:spPr>
+        <p:style>
+          <a:lnRef idx="2">
+            <a:schemeClr val="accent1">
+              <a:shade val="50000"/>
+            </a:schemeClr>
+          </a:lnRef>
+          <a:fillRef idx="1">
+            <a:schemeClr val="accent1"/>
+          </a:fillRef>
+          <a:effectRef idx="0">
+            <a:schemeClr val="accent1"/>
+          </a:effectRef>
+          <a:fontRef idx="minor">
+            <a:schemeClr val="lt1"/>
+          </a:fontRef>
+        </p:style>
+        <p:txBody>
+          <a:bodyPr rtlCol="0" anchor="ctr"/>
+          <a:lstStyle/>
+          <a:p>
+            <a:endParaRPr lang="en-US" dirty="0">
+              <a:solidFill>
+                <a:srgbClr val="000000"/>
+              </a:solidFill>
+            </a:endParaRPr>
+          </a:p>
+        </p:txBody>
+      </p:sp>
+      <p:sp>
+        <p:nvSpPr>
+          <p:cNvPr id="48" name="Rectangle 47">
+            <a:extLst>
+              <a:ext uri="{FF2B5EF4-FFF2-40B4-BE49-F238E27FC236}">
+                <a16:creationId xmlns:a16="http://schemas.microsoft.com/office/drawing/2014/main" id="{1E322921-DE60-4BFF-8CC0-986B6AC17011}"/>
+              </a:ext>
+            </a:extLst>
+          </p:cNvPr>
+          <p:cNvSpPr/>
+          <p:nvPr/>
+        </p:nvSpPr>
+        <p:spPr>
+          <a:xfrm>
+            <a:off x="1295400" y="2895600"/>
+            <a:ext cx="7543800" cy="304800"/>
+          </a:xfrm>
+          <a:prstGeom prst="rect">
+            <a:avLst/>
+          </a:prstGeom>
+          <a:solidFill>
+            <a:srgbClr val="B0C6E1"/>
+          </a:solidFill>
+          <a:ln w="12700">
+            <a:noFill/>
+          </a:ln>
+        </p:spPr>
+        <p:style>
+          <a:lnRef idx="2">
+            <a:schemeClr val="accent1">
+              <a:shade val="50000"/>
+            </a:schemeClr>
+          </a:lnRef>
+          <a:fillRef idx="1">
+            <a:schemeClr val="accent1"/>
+          </a:fillRef>
+          <a:effectRef idx="0">
+            <a:schemeClr val="accent1"/>
+          </a:effectRef>
+          <a:fontRef idx="minor">
+            <a:schemeClr val="lt1"/>
+          </a:fontRef>
+        </p:style>
+        <p:txBody>
+          <a:bodyPr rtlCol="0" anchor="ctr"/>
+          <a:lstStyle/>
+          <a:p>
+            <a:endParaRPr lang="en-US" dirty="0">
+              <a:solidFill>
+                <a:srgbClr val="000000"/>
+              </a:solidFill>
+            </a:endParaRPr>
+          </a:p>
+        </p:txBody>
+      </p:sp>
+      <p:sp>
+        <p:nvSpPr>
+          <p:cNvPr id="49" name="Rectangle 48">
+            <a:extLst>
+              <a:ext uri="{FF2B5EF4-FFF2-40B4-BE49-F238E27FC236}">
+                <a16:creationId xmlns:a16="http://schemas.microsoft.com/office/drawing/2014/main" id="{023F9A62-05F9-40BE-AA6B-1C5957F11095}"/>
+              </a:ext>
+            </a:extLst>
+          </p:cNvPr>
+          <p:cNvSpPr/>
+          <p:nvPr/>
+        </p:nvSpPr>
+        <p:spPr>
+          <a:xfrm>
+            <a:off x="1295400" y="3581400"/>
+            <a:ext cx="7543800" cy="304800"/>
+          </a:xfrm>
+          <a:prstGeom prst="rect">
+            <a:avLst/>
+          </a:prstGeom>
+          <a:solidFill>
+            <a:srgbClr val="B0C6E1"/>
+          </a:solidFill>
+          <a:ln w="12700">
+            <a:noFill/>
+          </a:ln>
+        </p:spPr>
+        <p:style>
+          <a:lnRef idx="2">
+            <a:schemeClr val="accent1">
+              <a:shade val="50000"/>
+            </a:schemeClr>
+          </a:lnRef>
+          <a:fillRef idx="1">
+            <a:schemeClr val="accent1"/>
+          </a:fillRef>
+          <a:effectRef idx="0">
+            <a:schemeClr val="accent1"/>
+          </a:effectRef>
+          <a:fontRef idx="minor">
+            <a:schemeClr val="lt1"/>
+          </a:fontRef>
+        </p:style>
+        <p:txBody>
+          <a:bodyPr rtlCol="0" anchor="ctr"/>
+          <a:lstStyle/>
+          <a:p>
+            <a:endParaRPr lang="en-US" dirty="0">
+              <a:solidFill>
+                <a:srgbClr val="000000"/>
+              </a:solidFill>
+            </a:endParaRPr>
+          </a:p>
+        </p:txBody>
+      </p:sp>
+      <p:sp>
+        <p:nvSpPr>
+          <p:cNvPr id="50" name="Rectangle 49">
+            <a:extLst>
+              <a:ext uri="{FF2B5EF4-FFF2-40B4-BE49-F238E27FC236}">
+                <a16:creationId xmlns:a16="http://schemas.microsoft.com/office/drawing/2014/main" id="{52A7FFFF-E53C-403B-B0ED-69F1EC5063D2}"/>
+              </a:ext>
+            </a:extLst>
+          </p:cNvPr>
+          <p:cNvSpPr/>
+          <p:nvPr/>
+        </p:nvSpPr>
+        <p:spPr>
+          <a:xfrm>
+            <a:off x="1295400" y="4267200"/>
+            <a:ext cx="7543800" cy="304800"/>
+          </a:xfrm>
+          <a:prstGeom prst="rect">
+            <a:avLst/>
+          </a:prstGeom>
+          <a:solidFill>
+            <a:srgbClr val="B0C6E1"/>
+          </a:solidFill>
+          <a:ln w="12700">
+            <a:noFill/>
+          </a:ln>
+        </p:spPr>
+        <p:style>
+          <a:lnRef idx="2">
+            <a:schemeClr val="accent1">
+              <a:shade val="50000"/>
+            </a:schemeClr>
+          </a:lnRef>
+          <a:fillRef idx="1">
+            <a:schemeClr val="accent1"/>
+          </a:fillRef>
+          <a:effectRef idx="0">
+            <a:schemeClr val="accent1"/>
+          </a:effectRef>
+          <a:fontRef idx="minor">
+            <a:schemeClr val="lt1"/>
+          </a:fontRef>
+        </p:style>
+        <p:txBody>
+          <a:bodyPr rtlCol="0" anchor="ctr"/>
+          <a:lstStyle/>
+          <a:p>
+            <a:endParaRPr lang="en-US" dirty="0">
+              <a:solidFill>
+                <a:srgbClr val="000000"/>
+              </a:solidFill>
+            </a:endParaRPr>
+          </a:p>
+        </p:txBody>
+      </p:sp>
+      <p:sp>
+        <p:nvSpPr>
+          <p:cNvPr id="51" name="Rectangle 50">
+            <a:extLst>
+              <a:ext uri="{FF2B5EF4-FFF2-40B4-BE49-F238E27FC236}">
+                <a16:creationId xmlns:a16="http://schemas.microsoft.com/office/drawing/2014/main" id="{3BC8B312-6F15-4C38-8B7E-F2588749B397}"/>
+              </a:ext>
+            </a:extLst>
+          </p:cNvPr>
+          <p:cNvSpPr/>
+          <p:nvPr/>
+        </p:nvSpPr>
+        <p:spPr>
+          <a:xfrm>
+            <a:off x="1295400" y="4953000"/>
+            <a:ext cx="7543800" cy="304800"/>
+          </a:xfrm>
+          <a:prstGeom prst="rect">
+            <a:avLst/>
+          </a:prstGeom>
+          <a:solidFill>
+            <a:srgbClr val="B0C6E1"/>
+          </a:solidFill>
+          <a:ln w="12700">
+            <a:noFill/>
+          </a:ln>
+        </p:spPr>
+        <p:style>
+          <a:lnRef idx="2">
+            <a:schemeClr val="accent1">
+              <a:shade val="50000"/>
+            </a:schemeClr>
+          </a:lnRef>
+          <a:fillRef idx="1">
+            <a:schemeClr val="accent1"/>
+          </a:fillRef>
+          <a:effectRef idx="0">
+            <a:schemeClr val="accent1"/>
+          </a:effectRef>
+          <a:fontRef idx="minor">
+            <a:schemeClr val="lt1"/>
+          </a:fontRef>
+        </p:style>
+        <p:txBody>
+          <a:bodyPr rtlCol="0" anchor="ctr"/>
+          <a:lstStyle/>
+          <a:p>
+            <a:endParaRPr lang="en-US" dirty="0">
+              <a:solidFill>
+                <a:srgbClr val="000000"/>
+              </a:solidFill>
+            </a:endParaRPr>
+          </a:p>
+        </p:txBody>
+      </p:sp>
+      <p:sp>
+        <p:nvSpPr>
+          <p:cNvPr id="2" name="Rectangle 1"/>
+          <p:cNvSpPr/>
+          <p:nvPr/>
+        </p:nvSpPr>
+        <p:spPr>
+          <a:xfrm>
+            <a:off x="4495800" y="73460"/>
+            <a:ext cx="762000" cy="5946340"/>
+          </a:xfrm>
+          <a:prstGeom prst="rect">
+            <a:avLst/>
+          </a:prstGeom>
+          <a:solidFill>
+            <a:srgbClr val="C0504D">
+              <a:alpha val="40000"/>
+            </a:srgbClr>
+          </a:solidFill>
+          <a:ln>
+            <a:noFill/>
+          </a:ln>
+        </p:spPr>
+        <p:style>
+          <a:lnRef idx="2">
+            <a:schemeClr val="accent1">
+              <a:shade val="50000"/>
+            </a:schemeClr>
+          </a:lnRef>
+          <a:fillRef idx="1">
+            <a:schemeClr val="accent1"/>
+          </a:fillRef>
+          <a:effectRef idx="0">
+            <a:schemeClr val="accent1"/>
+          </a:effectRef>
+          <a:fontRef idx="minor">
+            <a:schemeClr val="lt1"/>
+          </a:fontRef>
+        </p:style>
+        <p:txBody>
+          <a:bodyPr vert="vert" rtlCol="0" anchor="ctr"/>
+          <a:lstStyle/>
+          <a:p>
+            <a:endParaRPr lang="en-US" dirty="0">
+              <a:solidFill>
+                <a:schemeClr val="tx1"/>
+              </a:solidFill>
+            </a:endParaRPr>
+          </a:p>
+        </p:txBody>
+      </p:sp>
+      <p:sp>
+        <p:nvSpPr>
+          <p:cNvPr id="54" name="Rectangle 53"/>
+          <p:cNvSpPr/>
+          <p:nvPr/>
+        </p:nvSpPr>
+        <p:spPr>
+          <a:xfrm>
+            <a:off x="5638800" y="73460"/>
+            <a:ext cx="762000" cy="5946340"/>
+          </a:xfrm>
+          <a:prstGeom prst="rect">
+            <a:avLst/>
+          </a:prstGeom>
+          <a:solidFill>
+            <a:srgbClr val="C0504D">
+              <a:alpha val="40000"/>
+            </a:srgbClr>
+          </a:solidFill>
+          <a:ln>
+            <a:noFill/>
+          </a:ln>
+        </p:spPr>
+        <p:style>
+          <a:lnRef idx="2">
+            <a:schemeClr val="accent1">
+              <a:shade val="50000"/>
+            </a:schemeClr>
+          </a:lnRef>
+          <a:fillRef idx="1">
+            <a:schemeClr val="accent1"/>
+          </a:fillRef>
+          <a:effectRef idx="0">
+            <a:schemeClr val="accent1"/>
+          </a:effectRef>
+          <a:fontRef idx="minor">
+            <a:schemeClr val="lt1"/>
+          </a:fontRef>
+        </p:style>
+        <p:txBody>
+          <a:bodyPr vert="vert" rtlCol="0" anchor="ctr"/>
+          <a:lstStyle/>
+          <a:p>
+            <a:endParaRPr lang="en-US" dirty="0">
+              <a:solidFill>
+                <a:schemeClr val="tx1"/>
+              </a:solidFill>
+            </a:endParaRPr>
+          </a:p>
+        </p:txBody>
+      </p:sp>
+      <p:sp>
+        <p:nvSpPr>
+          <p:cNvPr id="56" name="Rectangle 55"/>
+          <p:cNvSpPr/>
+          <p:nvPr/>
+        </p:nvSpPr>
+        <p:spPr>
+          <a:xfrm>
+            <a:off x="7924800" y="73460"/>
+            <a:ext cx="761999" cy="5946340"/>
+          </a:xfrm>
+          <a:prstGeom prst="rect">
+            <a:avLst/>
+          </a:prstGeom>
+          <a:solidFill>
+            <a:srgbClr val="C0504D">
+              <a:alpha val="40000"/>
+            </a:srgbClr>
+          </a:solidFill>
+          <a:ln>
+            <a:noFill/>
+          </a:ln>
+        </p:spPr>
+        <p:style>
+          <a:lnRef idx="2">
+            <a:schemeClr val="accent1">
+              <a:shade val="50000"/>
+            </a:schemeClr>
+          </a:lnRef>
+          <a:fillRef idx="1">
+            <a:schemeClr val="accent1"/>
+          </a:fillRef>
+          <a:effectRef idx="0">
+            <a:schemeClr val="accent1"/>
+          </a:effectRef>
+          <a:fontRef idx="minor">
+            <a:schemeClr val="lt1"/>
+          </a:fontRef>
+        </p:style>
+        <p:txBody>
+          <a:bodyPr vert="vert" rtlCol="0" anchor="ctr"/>
+          <a:lstStyle/>
+          <a:p>
+            <a:endParaRPr lang="en-US" dirty="0">
+              <a:solidFill>
+                <a:schemeClr val="tx1"/>
+              </a:solidFill>
+            </a:endParaRPr>
+          </a:p>
+        </p:txBody>
+      </p:sp>
+      <p:sp>
+        <p:nvSpPr>
+          <p:cNvPr id="58" name="Rectangle 57"/>
+          <p:cNvSpPr/>
+          <p:nvPr/>
+        </p:nvSpPr>
+        <p:spPr>
+          <a:xfrm>
+            <a:off x="6781800" y="73460"/>
+            <a:ext cx="761999" cy="5946340"/>
+          </a:xfrm>
+          <a:prstGeom prst="rect">
+            <a:avLst/>
+          </a:prstGeom>
+          <a:solidFill>
+            <a:srgbClr val="C0504D">
+              <a:alpha val="40000"/>
+            </a:srgbClr>
+          </a:solidFill>
+          <a:ln>
+            <a:noFill/>
+          </a:ln>
+        </p:spPr>
+        <p:style>
+          <a:lnRef idx="2">
+            <a:schemeClr val="accent1">
+              <a:shade val="50000"/>
+            </a:schemeClr>
+          </a:lnRef>
+          <a:fillRef idx="1">
+            <a:schemeClr val="accent1"/>
+          </a:fillRef>
+          <a:effectRef idx="0">
+            <a:schemeClr val="accent1"/>
+          </a:effectRef>
+          <a:fontRef idx="minor">
+            <a:schemeClr val="lt1"/>
+          </a:fontRef>
+        </p:style>
+        <p:txBody>
+          <a:bodyPr vert="vert" rtlCol="0" anchor="ctr"/>
+          <a:lstStyle/>
+          <a:p>
+            <a:endParaRPr lang="en-US" dirty="0">
+              <a:solidFill>
+                <a:schemeClr val="tx1"/>
+              </a:solidFill>
+            </a:endParaRPr>
+          </a:p>
+        </p:txBody>
+      </p:sp>
+      <p:sp>
+        <p:nvSpPr>
+          <p:cNvPr id="55" name="Rounded Rectangle 20">
+            <a:extLst>
+              <a:ext uri="{FF2B5EF4-FFF2-40B4-BE49-F238E27FC236}">
+                <a16:creationId xmlns:a16="http://schemas.microsoft.com/office/drawing/2014/main" id="{20C36109-8C46-49E1-9FBA-8D817DDAE5C8}"/>
+              </a:ext>
+            </a:extLst>
+          </p:cNvPr>
+          <p:cNvSpPr/>
+          <p:nvPr/>
+        </p:nvSpPr>
+        <p:spPr>
+          <a:xfrm>
+            <a:off x="4343400" y="1371600"/>
+            <a:ext cx="2133600" cy="3352800"/>
+          </a:xfrm>
+          <a:prstGeom prst="roundRect">
+            <a:avLst/>
+          </a:prstGeom>
+          <a:solidFill>
+            <a:schemeClr val="accent2">
+              <a:lumMod val="75000"/>
+            </a:schemeClr>
+          </a:solidFill>
+          <a:ln w="12700">
+            <a:solidFill>
+              <a:schemeClr val="tx1"/>
+            </a:solidFill>
+          </a:ln>
+        </p:spPr>
+        <p:style>
+          <a:lnRef idx="2">
+            <a:schemeClr val="accent1">
+              <a:shade val="50000"/>
+            </a:schemeClr>
+          </a:lnRef>
+          <a:fillRef idx="1">
+            <a:schemeClr val="accent1"/>
+          </a:fillRef>
+          <a:effectRef idx="0">
+            <a:schemeClr val="accent1"/>
+          </a:effectRef>
+          <a:fontRef idx="minor">
+            <a:schemeClr val="lt1"/>
+          </a:fontRef>
+        </p:style>
+        <p:txBody>
+          <a:bodyPr wrap="square" lIns="45720" tIns="0" rIns="9144" bIns="0" rtlCol="0" anchor="t" anchorCtr="0"/>
+          <a:lstStyle/>
+          <a:p>
+            <a:endParaRPr lang="en-US" sz="1400" dirty="0">
+              <a:solidFill>
+                <a:schemeClr val="tx1"/>
+              </a:solidFill>
+            </a:endParaRPr>
+          </a:p>
+        </p:txBody>
+      </p:sp>
+    </p:spTree>
+    <p:extLst>
+      <p:ext uri="{BB962C8B-B14F-4D97-AF65-F5344CB8AC3E}">
+        <p14:creationId xmlns:p14="http://schemas.microsoft.com/office/powerpoint/2010/main" val="2963703012"/>
+      </p:ext>
+    </p:extLst>
+  </p:cSld>
+  <p:clrMapOvr>
+    <a:masterClrMapping/>
+  </p:clrMapOvr>
+</p:sld>
+</file>
+
+<file path=ppt/slides/slide6.xml><?xml version="1.0" encoding="utf-8"?>
+<p:sld xmlns:a="http://schemas.openxmlformats.org/drawingml/2006/main" xmlns:r="http://schemas.openxmlformats.org/officeDocument/2006/relationships" xmlns:p="http://schemas.openxmlformats.org/presentationml/2006/main">
+  <p:cSld>
+    <p:spTree>
+      <p:nvGrpSpPr>
+        <p:cNvPr id="1" name=""/>
+        <p:cNvGrpSpPr/>
+        <p:nvPr/>
+      </p:nvGrpSpPr>
+      <p:grpSpPr>
+        <a:xfrm>
+          <a:off x="0" y="0"/>
+          <a:ext cx="0" cy="0"/>
+          <a:chOff x="0" y="0"/>
+          <a:chExt cx="0" cy="0"/>
+        </a:xfrm>
+      </p:grpSpPr>
+      <p:sp>
+        <p:nvSpPr>
+          <p:cNvPr id="77" name="Rectangle 76">
+            <a:extLst>
+              <a:ext uri="{FF2B5EF4-FFF2-40B4-BE49-F238E27FC236}">
+                <a16:creationId xmlns:a16="http://schemas.microsoft.com/office/drawing/2014/main" id="{33E03DD4-58B8-4D84-81B8-890E74C1E17A}"/>
+              </a:ext>
+            </a:extLst>
+          </p:cNvPr>
+          <p:cNvSpPr/>
+          <p:nvPr/>
+        </p:nvSpPr>
+        <p:spPr>
+          <a:xfrm>
+            <a:off x="1295400" y="1524000"/>
+            <a:ext cx="381000" cy="1676400"/>
+          </a:xfrm>
+          <a:prstGeom prst="rect">
+            <a:avLst/>
+          </a:prstGeom>
+          <a:solidFill>
+            <a:srgbClr val="B0C6E1"/>
+          </a:solidFill>
+          <a:ln w="12700">
+            <a:noFill/>
+          </a:ln>
+        </p:spPr>
+        <p:style>
+          <a:lnRef idx="2">
+            <a:schemeClr val="accent1">
+              <a:shade val="50000"/>
+            </a:schemeClr>
+          </a:lnRef>
+          <a:fillRef idx="1">
+            <a:schemeClr val="accent1"/>
+          </a:fillRef>
+          <a:effectRef idx="0">
+            <a:schemeClr val="accent1"/>
+          </a:effectRef>
+          <a:fontRef idx="minor">
+            <a:schemeClr val="lt1"/>
+          </a:fontRef>
+        </p:style>
+        <p:txBody>
+          <a:bodyPr rtlCol="0" anchor="ctr"/>
+          <a:lstStyle/>
+          <a:p>
+            <a:endParaRPr lang="en-US">
+              <a:solidFill>
+                <a:srgbClr val="000000"/>
+              </a:solidFill>
+            </a:endParaRPr>
+          </a:p>
+        </p:txBody>
+      </p:sp>
+      <p:sp>
+        <p:nvSpPr>
+          <p:cNvPr id="78" name="Rectangle 77">
+            <a:extLst>
+              <a:ext uri="{FF2B5EF4-FFF2-40B4-BE49-F238E27FC236}">
+                <a16:creationId xmlns:a16="http://schemas.microsoft.com/office/drawing/2014/main" id="{5A6BABA4-FFD3-46EC-8366-B18DEE47420B}"/>
+              </a:ext>
+            </a:extLst>
+          </p:cNvPr>
+          <p:cNvSpPr/>
+          <p:nvPr/>
+        </p:nvSpPr>
+        <p:spPr>
+          <a:xfrm>
+            <a:off x="1295400" y="3581400"/>
+            <a:ext cx="381000" cy="1676400"/>
+          </a:xfrm>
+          <a:prstGeom prst="rect">
+            <a:avLst/>
+          </a:prstGeom>
+          <a:solidFill>
+            <a:srgbClr val="B0C6E1"/>
+          </a:solidFill>
+          <a:ln w="12700">
+            <a:noFill/>
+          </a:ln>
+        </p:spPr>
+        <p:style>
+          <a:lnRef idx="2">
+            <a:schemeClr val="accent1">
+              <a:shade val="50000"/>
+            </a:schemeClr>
+          </a:lnRef>
+          <a:fillRef idx="1">
+            <a:schemeClr val="accent1"/>
+          </a:fillRef>
+          <a:effectRef idx="0">
+            <a:schemeClr val="accent1"/>
+          </a:effectRef>
+          <a:fontRef idx="minor">
+            <a:schemeClr val="lt1"/>
+          </a:fontRef>
+        </p:style>
+        <p:txBody>
+          <a:bodyPr rtlCol="0" anchor="ctr"/>
+          <a:lstStyle/>
+          <a:p>
+            <a:endParaRPr lang="en-US">
+              <a:solidFill>
+                <a:srgbClr val="000000"/>
+              </a:solidFill>
+            </a:endParaRPr>
+          </a:p>
+        </p:txBody>
+      </p:sp>
+      <p:sp>
+        <p:nvSpPr>
+          <p:cNvPr id="79" name="Rectangle 78">
+            <a:extLst>
+              <a:ext uri="{FF2B5EF4-FFF2-40B4-BE49-F238E27FC236}">
+                <a16:creationId xmlns:a16="http://schemas.microsoft.com/office/drawing/2014/main" id="{3D5629A0-55CD-4EEB-BE29-B63359C7AC5A}"/>
+              </a:ext>
+            </a:extLst>
+          </p:cNvPr>
+          <p:cNvSpPr/>
+          <p:nvPr/>
+        </p:nvSpPr>
+        <p:spPr>
+          <a:xfrm>
+            <a:off x="533400" y="1905000"/>
+            <a:ext cx="381000" cy="4038600"/>
+          </a:xfrm>
+          <a:prstGeom prst="rect">
+            <a:avLst/>
+          </a:prstGeom>
+          <a:solidFill>
+            <a:srgbClr val="B0C6E1"/>
+          </a:solidFill>
+          <a:ln w="12700">
+            <a:noFill/>
+          </a:ln>
+        </p:spPr>
+        <p:style>
+          <a:lnRef idx="2">
+            <a:schemeClr val="accent1">
+              <a:shade val="50000"/>
+            </a:schemeClr>
+          </a:lnRef>
+          <a:fillRef idx="1">
+            <a:schemeClr val="accent1"/>
+          </a:fillRef>
+          <a:effectRef idx="0">
+            <a:schemeClr val="accent1"/>
+          </a:effectRef>
+          <a:fontRef idx="minor">
+            <a:schemeClr val="lt1"/>
+          </a:fontRef>
+        </p:style>
+        <p:txBody>
+          <a:bodyPr rtlCol="0" anchor="ctr"/>
+          <a:lstStyle/>
+          <a:p>
+            <a:endParaRPr lang="en-US">
+              <a:solidFill>
+                <a:srgbClr val="000000"/>
+              </a:solidFill>
+            </a:endParaRPr>
+          </a:p>
+        </p:txBody>
+      </p:sp>
+      <p:sp>
+        <p:nvSpPr>
+          <p:cNvPr id="80" name="Rectangle 79">
+            <a:extLst>
+              <a:ext uri="{FF2B5EF4-FFF2-40B4-BE49-F238E27FC236}">
+                <a16:creationId xmlns:a16="http://schemas.microsoft.com/office/drawing/2014/main" id="{1EB438D2-118B-4AC7-8396-17EF60C6CA43}"/>
+              </a:ext>
+            </a:extLst>
+          </p:cNvPr>
+          <p:cNvSpPr/>
+          <p:nvPr/>
+        </p:nvSpPr>
+        <p:spPr>
+          <a:xfrm>
+            <a:off x="76200" y="3048000"/>
+            <a:ext cx="1143000" cy="685800"/>
+          </a:xfrm>
+          <a:prstGeom prst="rect">
+            <a:avLst/>
+          </a:prstGeom>
+          <a:solidFill>
+            <a:srgbClr val="B0C6E1"/>
+          </a:solidFill>
+          <a:ln w="12700">
+            <a:noFill/>
+          </a:ln>
+        </p:spPr>
+        <p:style>
+          <a:lnRef idx="2">
+            <a:schemeClr val="accent1">
+              <a:shade val="50000"/>
+            </a:schemeClr>
+          </a:lnRef>
+          <a:fillRef idx="1">
+            <a:schemeClr val="accent1"/>
+          </a:fillRef>
+          <a:effectRef idx="0">
+            <a:schemeClr val="accent1"/>
+          </a:effectRef>
+          <a:fontRef idx="minor">
+            <a:schemeClr val="lt1"/>
+          </a:fontRef>
+        </p:style>
+        <p:txBody>
+          <a:bodyPr rtlCol="0" anchor="ctr"/>
+          <a:lstStyle/>
+          <a:p>
+            <a:endParaRPr lang="en-US" dirty="0">
+              <a:solidFill>
+                <a:srgbClr val="000000"/>
+              </a:solidFill>
+            </a:endParaRPr>
+          </a:p>
+        </p:txBody>
+      </p:sp>
+      <p:sp>
+        <p:nvSpPr>
+          <p:cNvPr id="64" name="Rectangle 63">
+            <a:extLst>
+              <a:ext uri="{FF2B5EF4-FFF2-40B4-BE49-F238E27FC236}">
+                <a16:creationId xmlns:a16="http://schemas.microsoft.com/office/drawing/2014/main" id="{7A9FA661-12AD-47BA-95C7-6CA9D6C2B43D}"/>
+              </a:ext>
+            </a:extLst>
+          </p:cNvPr>
+          <p:cNvSpPr/>
+          <p:nvPr/>
+        </p:nvSpPr>
+        <p:spPr>
+          <a:xfrm>
+            <a:off x="533400" y="1866900"/>
+            <a:ext cx="2019300" cy="304800"/>
+          </a:xfrm>
+          <a:prstGeom prst="rect">
+            <a:avLst/>
+          </a:prstGeom>
+          <a:solidFill>
+            <a:srgbClr val="B0C6E1"/>
+          </a:solidFill>
+          <a:ln w="12700">
+            <a:noFill/>
+          </a:ln>
+        </p:spPr>
+        <p:style>
+          <a:lnRef idx="2">
+            <a:schemeClr val="accent1">
+              <a:shade val="50000"/>
+            </a:schemeClr>
+          </a:lnRef>
+          <a:fillRef idx="1">
+            <a:schemeClr val="accent1"/>
+          </a:fillRef>
+          <a:effectRef idx="0">
+            <a:schemeClr val="accent1"/>
+          </a:effectRef>
+          <a:fontRef idx="minor">
+            <a:schemeClr val="lt1"/>
+          </a:fontRef>
+        </p:style>
+        <p:txBody>
+          <a:bodyPr rtlCol="0" anchor="ctr"/>
+          <a:lstStyle/>
+          <a:p>
+            <a:endParaRPr lang="en-US" dirty="0">
+              <a:solidFill>
+                <a:srgbClr val="000000"/>
+              </a:solidFill>
+            </a:endParaRPr>
+          </a:p>
+        </p:txBody>
+      </p:sp>
+      <p:sp>
+        <p:nvSpPr>
+          <p:cNvPr id="76" name="Rectangle 75">
+            <a:extLst>
+              <a:ext uri="{FF2B5EF4-FFF2-40B4-BE49-F238E27FC236}">
+                <a16:creationId xmlns:a16="http://schemas.microsoft.com/office/drawing/2014/main" id="{43EF6C0C-AB74-462D-BC92-578F345D5EB7}"/>
+              </a:ext>
+            </a:extLst>
+          </p:cNvPr>
+          <p:cNvSpPr/>
+          <p:nvPr/>
+        </p:nvSpPr>
+        <p:spPr>
+          <a:xfrm>
+            <a:off x="533400" y="3924300"/>
+            <a:ext cx="2019300" cy="304800"/>
+          </a:xfrm>
+          <a:prstGeom prst="rect">
+            <a:avLst/>
+          </a:prstGeom>
+          <a:solidFill>
+            <a:srgbClr val="B0C6E1"/>
+          </a:solidFill>
+          <a:ln w="12700">
+            <a:noFill/>
+          </a:ln>
+        </p:spPr>
+        <p:style>
+          <a:lnRef idx="2">
+            <a:schemeClr val="accent1">
+              <a:shade val="50000"/>
+            </a:schemeClr>
+          </a:lnRef>
+          <a:fillRef idx="1">
+            <a:schemeClr val="accent1"/>
+          </a:fillRef>
+          <a:effectRef idx="0">
+            <a:schemeClr val="accent1"/>
+          </a:effectRef>
+          <a:fontRef idx="minor">
+            <a:schemeClr val="lt1"/>
+          </a:fontRef>
+        </p:style>
+        <p:txBody>
+          <a:bodyPr rtlCol="0" anchor="ctr"/>
+          <a:lstStyle/>
+          <a:p>
+            <a:endParaRPr lang="en-US" dirty="0">
+              <a:solidFill>
+                <a:srgbClr val="000000"/>
+              </a:solidFill>
+            </a:endParaRPr>
+          </a:p>
+        </p:txBody>
+      </p:sp>
+      <p:sp>
+        <p:nvSpPr>
+          <p:cNvPr id="52" name="Rectangle 51">
+            <a:extLst>
+              <a:ext uri="{FF2B5EF4-FFF2-40B4-BE49-F238E27FC236}">
+                <a16:creationId xmlns:a16="http://schemas.microsoft.com/office/drawing/2014/main" id="{B1123211-0A47-43F4-B5D5-3C9F0EF3D0E2}"/>
+              </a:ext>
+            </a:extLst>
+          </p:cNvPr>
+          <p:cNvSpPr/>
+          <p:nvPr/>
+        </p:nvSpPr>
+        <p:spPr>
+          <a:xfrm>
+            <a:off x="533400" y="5638800"/>
+            <a:ext cx="8305800" cy="304800"/>
+          </a:xfrm>
+          <a:prstGeom prst="rect">
+            <a:avLst/>
+          </a:prstGeom>
+          <a:solidFill>
+            <a:srgbClr val="B0C6E1"/>
+          </a:solidFill>
+          <a:ln w="12700">
+            <a:noFill/>
+          </a:ln>
+        </p:spPr>
+        <p:style>
+          <a:lnRef idx="2">
+            <a:schemeClr val="accent1">
+              <a:shade val="50000"/>
+            </a:schemeClr>
+          </a:lnRef>
+          <a:fillRef idx="1">
+            <a:schemeClr val="accent1"/>
+          </a:fillRef>
+          <a:effectRef idx="0">
+            <a:schemeClr val="accent1"/>
+          </a:effectRef>
+          <a:fontRef idx="minor">
+            <a:schemeClr val="lt1"/>
+          </a:fontRef>
+        </p:style>
+        <p:txBody>
+          <a:bodyPr rtlCol="0" anchor="ctr"/>
+          <a:lstStyle/>
+          <a:p>
+            <a:endParaRPr lang="en-US" dirty="0">
+              <a:solidFill>
+                <a:srgbClr val="000000"/>
+              </a:solidFill>
+            </a:endParaRPr>
+          </a:p>
+        </p:txBody>
+      </p:sp>
+      <p:sp>
+        <p:nvSpPr>
+          <p:cNvPr id="5" name="Rectangle 4">
+            <a:extLst>
+              <a:ext uri="{FF2B5EF4-FFF2-40B4-BE49-F238E27FC236}">
+                <a16:creationId xmlns:a16="http://schemas.microsoft.com/office/drawing/2014/main" id="{C6706F1E-6D81-4DF0-9BC7-A7D48695D99C}"/>
+              </a:ext>
+            </a:extLst>
+          </p:cNvPr>
+          <p:cNvSpPr/>
+          <p:nvPr/>
+        </p:nvSpPr>
+        <p:spPr>
+          <a:xfrm>
+            <a:off x="1295400" y="1524000"/>
+            <a:ext cx="7543800" cy="304800"/>
+          </a:xfrm>
+          <a:prstGeom prst="rect">
+            <a:avLst/>
+          </a:prstGeom>
+          <a:solidFill>
+            <a:srgbClr val="B0C6E1"/>
+          </a:solidFill>
+          <a:ln w="12700">
+            <a:noFill/>
+          </a:ln>
+        </p:spPr>
+        <p:style>
+          <a:lnRef idx="2">
+            <a:schemeClr val="accent1">
+              <a:shade val="50000"/>
+            </a:schemeClr>
+          </a:lnRef>
+          <a:fillRef idx="1">
+            <a:schemeClr val="accent1"/>
+          </a:fillRef>
+          <a:effectRef idx="0">
+            <a:schemeClr val="accent1"/>
+          </a:effectRef>
+          <a:fontRef idx="minor">
+            <a:schemeClr val="lt1"/>
+          </a:fontRef>
+        </p:style>
+        <p:txBody>
+          <a:bodyPr rtlCol="0" anchor="ctr"/>
+          <a:lstStyle/>
+          <a:p>
+            <a:endParaRPr lang="en-US" dirty="0">
+              <a:solidFill>
+                <a:srgbClr val="000000"/>
+              </a:solidFill>
+            </a:endParaRPr>
+          </a:p>
+        </p:txBody>
+      </p:sp>
+      <p:sp>
+        <p:nvSpPr>
+          <p:cNvPr id="47" name="Rectangle 46">
+            <a:extLst>
+              <a:ext uri="{FF2B5EF4-FFF2-40B4-BE49-F238E27FC236}">
+                <a16:creationId xmlns:a16="http://schemas.microsoft.com/office/drawing/2014/main" id="{D13E14B6-C5F9-4921-B47A-A713D13FD3B7}"/>
+              </a:ext>
+            </a:extLst>
+          </p:cNvPr>
+          <p:cNvSpPr/>
+          <p:nvPr/>
+        </p:nvSpPr>
+        <p:spPr>
+          <a:xfrm>
+            <a:off x="1295400" y="2209800"/>
+            <a:ext cx="7543800" cy="304800"/>
+          </a:xfrm>
+          <a:prstGeom prst="rect">
+            <a:avLst/>
+          </a:prstGeom>
+          <a:solidFill>
+            <a:srgbClr val="B0C6E1"/>
+          </a:solidFill>
+          <a:ln w="12700">
+            <a:noFill/>
+          </a:ln>
+        </p:spPr>
+        <p:style>
+          <a:lnRef idx="2">
+            <a:schemeClr val="accent1">
+              <a:shade val="50000"/>
+            </a:schemeClr>
+          </a:lnRef>
+          <a:fillRef idx="1">
+            <a:schemeClr val="accent1"/>
+          </a:fillRef>
+          <a:effectRef idx="0">
+            <a:schemeClr val="accent1"/>
+          </a:effectRef>
+          <a:fontRef idx="minor">
+            <a:schemeClr val="lt1"/>
+          </a:fontRef>
+        </p:style>
+        <p:txBody>
+          <a:bodyPr rtlCol="0" anchor="ctr"/>
+          <a:lstStyle/>
+          <a:p>
+            <a:endParaRPr lang="en-US" dirty="0">
+              <a:solidFill>
+                <a:srgbClr val="000000"/>
+              </a:solidFill>
+            </a:endParaRPr>
+          </a:p>
+        </p:txBody>
+      </p:sp>
+      <p:sp>
+        <p:nvSpPr>
+          <p:cNvPr id="48" name="Rectangle 47">
+            <a:extLst>
+              <a:ext uri="{FF2B5EF4-FFF2-40B4-BE49-F238E27FC236}">
+                <a16:creationId xmlns:a16="http://schemas.microsoft.com/office/drawing/2014/main" id="{1E322921-DE60-4BFF-8CC0-986B6AC17011}"/>
+              </a:ext>
+            </a:extLst>
+          </p:cNvPr>
+          <p:cNvSpPr/>
+          <p:nvPr/>
+        </p:nvSpPr>
+        <p:spPr>
+          <a:xfrm>
+            <a:off x="1295400" y="2895600"/>
+            <a:ext cx="7543800" cy="304800"/>
+          </a:xfrm>
+          <a:prstGeom prst="rect">
+            <a:avLst/>
+          </a:prstGeom>
+          <a:solidFill>
+            <a:srgbClr val="B0C6E1"/>
+          </a:solidFill>
+          <a:ln w="12700">
+            <a:noFill/>
+          </a:ln>
+        </p:spPr>
+        <p:style>
+          <a:lnRef idx="2">
+            <a:schemeClr val="accent1">
+              <a:shade val="50000"/>
+            </a:schemeClr>
+          </a:lnRef>
+          <a:fillRef idx="1">
+            <a:schemeClr val="accent1"/>
+          </a:fillRef>
+          <a:effectRef idx="0">
+            <a:schemeClr val="accent1"/>
+          </a:effectRef>
+          <a:fontRef idx="minor">
+            <a:schemeClr val="lt1"/>
+          </a:fontRef>
+        </p:style>
+        <p:txBody>
+          <a:bodyPr rtlCol="0" anchor="ctr"/>
+          <a:lstStyle/>
+          <a:p>
+            <a:endParaRPr lang="en-US" dirty="0">
+              <a:solidFill>
+                <a:srgbClr val="000000"/>
+              </a:solidFill>
+            </a:endParaRPr>
+          </a:p>
+        </p:txBody>
+      </p:sp>
+      <p:sp>
+        <p:nvSpPr>
+          <p:cNvPr id="49" name="Rectangle 48">
+            <a:extLst>
+              <a:ext uri="{FF2B5EF4-FFF2-40B4-BE49-F238E27FC236}">
+                <a16:creationId xmlns:a16="http://schemas.microsoft.com/office/drawing/2014/main" id="{023F9A62-05F9-40BE-AA6B-1C5957F11095}"/>
+              </a:ext>
+            </a:extLst>
+          </p:cNvPr>
+          <p:cNvSpPr/>
+          <p:nvPr/>
+        </p:nvSpPr>
+        <p:spPr>
+          <a:xfrm>
+            <a:off x="1295400" y="3581400"/>
+            <a:ext cx="7543800" cy="304800"/>
+          </a:xfrm>
+          <a:prstGeom prst="rect">
+            <a:avLst/>
+          </a:prstGeom>
+          <a:solidFill>
+            <a:srgbClr val="B0C6E1"/>
+          </a:solidFill>
+          <a:ln w="12700">
+            <a:noFill/>
+          </a:ln>
+        </p:spPr>
+        <p:style>
+          <a:lnRef idx="2">
+            <a:schemeClr val="accent1">
+              <a:shade val="50000"/>
+            </a:schemeClr>
+          </a:lnRef>
+          <a:fillRef idx="1">
+            <a:schemeClr val="accent1"/>
+          </a:fillRef>
+          <a:effectRef idx="0">
+            <a:schemeClr val="accent1"/>
+          </a:effectRef>
+          <a:fontRef idx="minor">
+            <a:schemeClr val="lt1"/>
+          </a:fontRef>
+        </p:style>
+        <p:txBody>
+          <a:bodyPr rtlCol="0" anchor="ctr"/>
+          <a:lstStyle/>
+          <a:p>
+            <a:endParaRPr lang="en-US" dirty="0">
+              <a:solidFill>
+                <a:srgbClr val="000000"/>
+              </a:solidFill>
+            </a:endParaRPr>
+          </a:p>
+        </p:txBody>
+      </p:sp>
+      <p:sp>
+        <p:nvSpPr>
+          <p:cNvPr id="50" name="Rectangle 49">
+            <a:extLst>
+              <a:ext uri="{FF2B5EF4-FFF2-40B4-BE49-F238E27FC236}">
+                <a16:creationId xmlns:a16="http://schemas.microsoft.com/office/drawing/2014/main" id="{52A7FFFF-E53C-403B-B0ED-69F1EC5063D2}"/>
+              </a:ext>
+            </a:extLst>
+          </p:cNvPr>
+          <p:cNvSpPr/>
+          <p:nvPr/>
+        </p:nvSpPr>
+        <p:spPr>
+          <a:xfrm>
+            <a:off x="1295400" y="4267200"/>
+            <a:ext cx="7543800" cy="304800"/>
+          </a:xfrm>
+          <a:prstGeom prst="rect">
+            <a:avLst/>
+          </a:prstGeom>
+          <a:solidFill>
+            <a:srgbClr val="B0C6E1"/>
+          </a:solidFill>
+          <a:ln w="12700">
+            <a:noFill/>
+          </a:ln>
+        </p:spPr>
+        <p:style>
+          <a:lnRef idx="2">
+            <a:schemeClr val="accent1">
+              <a:shade val="50000"/>
+            </a:schemeClr>
+          </a:lnRef>
+          <a:fillRef idx="1">
+            <a:schemeClr val="accent1"/>
+          </a:fillRef>
+          <a:effectRef idx="0">
+            <a:schemeClr val="accent1"/>
+          </a:effectRef>
+          <a:fontRef idx="minor">
+            <a:schemeClr val="lt1"/>
+          </a:fontRef>
+        </p:style>
+        <p:txBody>
+          <a:bodyPr rtlCol="0" anchor="ctr"/>
+          <a:lstStyle/>
+          <a:p>
+            <a:endParaRPr lang="en-US" dirty="0">
+              <a:solidFill>
+                <a:srgbClr val="000000"/>
+              </a:solidFill>
+            </a:endParaRPr>
+          </a:p>
+        </p:txBody>
+      </p:sp>
+      <p:sp>
+        <p:nvSpPr>
+          <p:cNvPr id="51" name="Rectangle 50">
+            <a:extLst>
+              <a:ext uri="{FF2B5EF4-FFF2-40B4-BE49-F238E27FC236}">
+                <a16:creationId xmlns:a16="http://schemas.microsoft.com/office/drawing/2014/main" id="{3BC8B312-6F15-4C38-8B7E-F2588749B397}"/>
+              </a:ext>
+            </a:extLst>
+          </p:cNvPr>
+          <p:cNvSpPr/>
+          <p:nvPr/>
+        </p:nvSpPr>
+        <p:spPr>
+          <a:xfrm>
+            <a:off x="1295400" y="4953000"/>
+            <a:ext cx="7543800" cy="304800"/>
+          </a:xfrm>
+          <a:prstGeom prst="rect">
+            <a:avLst/>
+          </a:prstGeom>
+          <a:solidFill>
+            <a:srgbClr val="B0C6E1"/>
+          </a:solidFill>
+          <a:ln w="12700">
+            <a:noFill/>
+          </a:ln>
+        </p:spPr>
+        <p:style>
+          <a:lnRef idx="2">
+            <a:schemeClr val="accent1">
+              <a:shade val="50000"/>
+            </a:schemeClr>
+          </a:lnRef>
+          <a:fillRef idx="1">
+            <a:schemeClr val="accent1"/>
+          </a:fillRef>
+          <a:effectRef idx="0">
+            <a:schemeClr val="accent1"/>
+          </a:effectRef>
+          <a:fontRef idx="minor">
+            <a:schemeClr val="lt1"/>
+          </a:fontRef>
+        </p:style>
+        <p:txBody>
+          <a:bodyPr rtlCol="0" anchor="ctr"/>
+          <a:lstStyle/>
+          <a:p>
+            <a:endParaRPr lang="en-US" dirty="0">
+              <a:solidFill>
+                <a:srgbClr val="000000"/>
+              </a:solidFill>
+            </a:endParaRPr>
+          </a:p>
+        </p:txBody>
+      </p:sp>
+      <p:sp>
+        <p:nvSpPr>
+          <p:cNvPr id="2" name="Rectangle 1"/>
+          <p:cNvSpPr/>
+          <p:nvPr/>
+        </p:nvSpPr>
+        <p:spPr>
+          <a:xfrm>
+            <a:off x="4495800" y="73460"/>
+            <a:ext cx="762000" cy="5946340"/>
+          </a:xfrm>
+          <a:prstGeom prst="rect">
+            <a:avLst/>
+          </a:prstGeom>
+          <a:solidFill>
+            <a:srgbClr val="C0504D">
+              <a:alpha val="40000"/>
+            </a:srgbClr>
+          </a:solidFill>
+          <a:ln>
+            <a:noFill/>
+          </a:ln>
+        </p:spPr>
+        <p:style>
+          <a:lnRef idx="2">
+            <a:schemeClr val="accent1">
+              <a:shade val="50000"/>
+            </a:schemeClr>
+          </a:lnRef>
+          <a:fillRef idx="1">
+            <a:schemeClr val="accent1"/>
+          </a:fillRef>
+          <a:effectRef idx="0">
+            <a:schemeClr val="accent1"/>
+          </a:effectRef>
+          <a:fontRef idx="minor">
+            <a:schemeClr val="lt1"/>
+          </a:fontRef>
+        </p:style>
+        <p:txBody>
+          <a:bodyPr vert="vert" rtlCol="0" anchor="ctr"/>
+          <a:lstStyle/>
+          <a:p>
+            <a:endParaRPr lang="en-US" dirty="0">
+              <a:solidFill>
+                <a:schemeClr val="tx1"/>
+              </a:solidFill>
+            </a:endParaRPr>
+          </a:p>
+        </p:txBody>
+      </p:sp>
+      <p:sp>
+        <p:nvSpPr>
+          <p:cNvPr id="54" name="Rectangle 53"/>
+          <p:cNvSpPr/>
+          <p:nvPr/>
+        </p:nvSpPr>
+        <p:spPr>
+          <a:xfrm>
+            <a:off x="5638800" y="73460"/>
+            <a:ext cx="762000" cy="5946340"/>
+          </a:xfrm>
+          <a:prstGeom prst="rect">
+            <a:avLst/>
+          </a:prstGeom>
+          <a:solidFill>
+            <a:srgbClr val="C0504D">
+              <a:alpha val="40000"/>
+            </a:srgbClr>
+          </a:solidFill>
+          <a:ln>
+            <a:noFill/>
+          </a:ln>
+        </p:spPr>
+        <p:style>
+          <a:lnRef idx="2">
+            <a:schemeClr val="accent1">
+              <a:shade val="50000"/>
+            </a:schemeClr>
+          </a:lnRef>
+          <a:fillRef idx="1">
+            <a:schemeClr val="accent1"/>
+          </a:fillRef>
+          <a:effectRef idx="0">
+            <a:schemeClr val="accent1"/>
+          </a:effectRef>
+          <a:fontRef idx="minor">
+            <a:schemeClr val="lt1"/>
+          </a:fontRef>
+        </p:style>
+        <p:txBody>
+          <a:bodyPr vert="vert" rtlCol="0" anchor="ctr"/>
+          <a:lstStyle/>
+          <a:p>
+            <a:endParaRPr lang="en-US" dirty="0">
+              <a:solidFill>
+                <a:schemeClr val="tx1"/>
+              </a:solidFill>
+            </a:endParaRPr>
+          </a:p>
+        </p:txBody>
+      </p:sp>
+      <p:sp>
+        <p:nvSpPr>
+          <p:cNvPr id="56" name="Rectangle 55"/>
+          <p:cNvSpPr/>
+          <p:nvPr/>
+        </p:nvSpPr>
+        <p:spPr>
+          <a:xfrm>
+            <a:off x="7924800" y="73460"/>
+            <a:ext cx="761999" cy="5946340"/>
+          </a:xfrm>
+          <a:prstGeom prst="rect">
+            <a:avLst/>
+          </a:prstGeom>
+          <a:solidFill>
+            <a:srgbClr val="C0504D">
+              <a:alpha val="40000"/>
+            </a:srgbClr>
+          </a:solidFill>
+          <a:ln>
+            <a:noFill/>
+          </a:ln>
+        </p:spPr>
+        <p:style>
+          <a:lnRef idx="2">
+            <a:schemeClr val="accent1">
+              <a:shade val="50000"/>
+            </a:schemeClr>
+          </a:lnRef>
+          <a:fillRef idx="1">
+            <a:schemeClr val="accent1"/>
+          </a:fillRef>
+          <a:effectRef idx="0">
+            <a:schemeClr val="accent1"/>
+          </a:effectRef>
+          <a:fontRef idx="minor">
+            <a:schemeClr val="lt1"/>
+          </a:fontRef>
+        </p:style>
+        <p:txBody>
+          <a:bodyPr vert="vert" rtlCol="0" anchor="ctr"/>
+          <a:lstStyle/>
+          <a:p>
+            <a:endParaRPr lang="en-US" dirty="0">
+              <a:solidFill>
+                <a:schemeClr val="tx1"/>
+              </a:solidFill>
+            </a:endParaRPr>
+          </a:p>
+        </p:txBody>
+      </p:sp>
+      <p:sp>
+        <p:nvSpPr>
+          <p:cNvPr id="58" name="Rectangle 57"/>
+          <p:cNvSpPr/>
+          <p:nvPr/>
+        </p:nvSpPr>
+        <p:spPr>
+          <a:xfrm>
+            <a:off x="6781800" y="73460"/>
+            <a:ext cx="761999" cy="5946340"/>
+          </a:xfrm>
+          <a:prstGeom prst="rect">
+            <a:avLst/>
+          </a:prstGeom>
+          <a:solidFill>
+            <a:srgbClr val="C0504D">
+              <a:alpha val="40000"/>
+            </a:srgbClr>
+          </a:solidFill>
+          <a:ln>
+            <a:noFill/>
+          </a:ln>
+        </p:spPr>
+        <p:style>
+          <a:lnRef idx="2">
+            <a:schemeClr val="accent1">
+              <a:shade val="50000"/>
+            </a:schemeClr>
+          </a:lnRef>
+          <a:fillRef idx="1">
+            <a:schemeClr val="accent1"/>
+          </a:fillRef>
+          <a:effectRef idx="0">
+            <a:schemeClr val="accent1"/>
+          </a:effectRef>
+          <a:fontRef idx="minor">
+            <a:schemeClr val="lt1"/>
+          </a:fontRef>
+        </p:style>
+        <p:txBody>
+          <a:bodyPr vert="vert" rtlCol="0" anchor="ctr"/>
+          <a:lstStyle/>
+          <a:p>
+            <a:endParaRPr lang="en-US" dirty="0">
+              <a:solidFill>
+                <a:schemeClr val="tx1"/>
+              </a:solidFill>
+            </a:endParaRPr>
+          </a:p>
+        </p:txBody>
+      </p:sp>
+      <p:sp>
+        <p:nvSpPr>
+          <p:cNvPr id="19" name="Rounded Rectangle 20">
+            <a:extLst>
+              <a:ext uri="{FF2B5EF4-FFF2-40B4-BE49-F238E27FC236}">
+                <a16:creationId xmlns:a16="http://schemas.microsoft.com/office/drawing/2014/main" id="{E5FCC8D7-B171-416E-B2F6-5AA7CA5D0E82}"/>
+              </a:ext>
+            </a:extLst>
+          </p:cNvPr>
+          <p:cNvSpPr/>
+          <p:nvPr/>
+        </p:nvSpPr>
+        <p:spPr>
+          <a:xfrm>
+            <a:off x="5410201" y="4724400"/>
+            <a:ext cx="2362198" cy="762000"/>
+          </a:xfrm>
+          <a:prstGeom prst="roundRect">
+            <a:avLst/>
+          </a:prstGeom>
+          <a:solidFill>
+            <a:schemeClr val="accent2">
+              <a:lumMod val="75000"/>
+            </a:schemeClr>
+          </a:solidFill>
+          <a:ln w="12700">
+            <a:solidFill>
+              <a:schemeClr val="tx1"/>
+            </a:solidFill>
+          </a:ln>
+        </p:spPr>
+        <p:style>
+          <a:lnRef idx="2">
+            <a:schemeClr val="accent1">
+              <a:shade val="50000"/>
+            </a:schemeClr>
+          </a:lnRef>
+          <a:fillRef idx="1">
+            <a:schemeClr val="accent1"/>
+          </a:fillRef>
+          <a:effectRef idx="0">
+            <a:schemeClr val="accent1"/>
+          </a:effectRef>
+          <a:fontRef idx="minor">
+            <a:schemeClr val="lt1"/>
+          </a:fontRef>
+        </p:style>
+        <p:txBody>
+          <a:bodyPr wrap="square" lIns="45720" tIns="0" rIns="9144" bIns="0" rtlCol="0" anchor="b" anchorCtr="0"/>
+          <a:lstStyle/>
+          <a:p>
+            <a:endParaRPr lang="en-US" sz="1400" dirty="0">
+              <a:solidFill>
+                <a:schemeClr val="tx1"/>
+              </a:solidFill>
+            </a:endParaRPr>
+          </a:p>
+        </p:txBody>
+      </p:sp>
+    </p:spTree>
+    <p:extLst>
+      <p:ext uri="{BB962C8B-B14F-4D97-AF65-F5344CB8AC3E}">
+        <p14:creationId xmlns:p14="http://schemas.microsoft.com/office/powerpoint/2010/main" val="2156329596"/>
+      </p:ext>
+    </p:extLst>
+  </p:cSld>
+  <p:clrMapOvr>
+    <a:masterClrMapping/>
+  </p:clrMapOvr>
+</p:sld>
+</file>
+
+<file path=ppt/slides/slide7.xml><?xml version="1.0" encoding="utf-8"?>
+<p:sld xmlns:a="http://schemas.openxmlformats.org/drawingml/2006/main" xmlns:r="http://schemas.openxmlformats.org/officeDocument/2006/relationships" xmlns:p="http://schemas.openxmlformats.org/presentationml/2006/main">
+  <p:cSld>
+    <p:spTree>
+      <p:nvGrpSpPr>
+        <p:cNvPr id="1" name=""/>
+        <p:cNvGrpSpPr/>
+        <p:nvPr/>
+      </p:nvGrpSpPr>
+      <p:grpSpPr>
+        <a:xfrm>
+          <a:off x="0" y="0"/>
+          <a:ext cx="0" cy="0"/>
+          <a:chOff x="0" y="0"/>
+          <a:chExt cx="0" cy="0"/>
+        </a:xfrm>
+      </p:grpSpPr>
+      <p:sp>
+        <p:nvSpPr>
+          <p:cNvPr id="77" name="Rectangle 76">
+            <a:extLst>
+              <a:ext uri="{FF2B5EF4-FFF2-40B4-BE49-F238E27FC236}">
+                <a16:creationId xmlns:a16="http://schemas.microsoft.com/office/drawing/2014/main" id="{33E03DD4-58B8-4D84-81B8-890E74C1E17A}"/>
+              </a:ext>
+            </a:extLst>
+          </p:cNvPr>
+          <p:cNvSpPr/>
+          <p:nvPr/>
+        </p:nvSpPr>
+        <p:spPr>
+          <a:xfrm>
+            <a:off x="1295400" y="1524000"/>
+            <a:ext cx="381000" cy="1676400"/>
+          </a:xfrm>
+          <a:prstGeom prst="rect">
+            <a:avLst/>
+          </a:prstGeom>
+          <a:solidFill>
+            <a:srgbClr val="B0C6E1"/>
+          </a:solidFill>
+          <a:ln w="12700">
+            <a:noFill/>
+          </a:ln>
+        </p:spPr>
+        <p:style>
+          <a:lnRef idx="2">
+            <a:schemeClr val="accent1">
+              <a:shade val="50000"/>
+            </a:schemeClr>
+          </a:lnRef>
+          <a:fillRef idx="1">
+            <a:schemeClr val="accent1"/>
+          </a:fillRef>
+          <a:effectRef idx="0">
+            <a:schemeClr val="accent1"/>
+          </a:effectRef>
+          <a:fontRef idx="minor">
+            <a:schemeClr val="lt1"/>
+          </a:fontRef>
+        </p:style>
+        <p:txBody>
+          <a:bodyPr rtlCol="0" anchor="ctr"/>
+          <a:lstStyle/>
+          <a:p>
+            <a:endParaRPr lang="en-US">
+              <a:solidFill>
+                <a:srgbClr val="000000"/>
+              </a:solidFill>
+            </a:endParaRPr>
+          </a:p>
+        </p:txBody>
+      </p:sp>
+      <p:sp>
+        <p:nvSpPr>
+          <p:cNvPr id="78" name="Rectangle 77">
+            <a:extLst>
+              <a:ext uri="{FF2B5EF4-FFF2-40B4-BE49-F238E27FC236}">
+                <a16:creationId xmlns:a16="http://schemas.microsoft.com/office/drawing/2014/main" id="{5A6BABA4-FFD3-46EC-8366-B18DEE47420B}"/>
+              </a:ext>
+            </a:extLst>
+          </p:cNvPr>
+          <p:cNvSpPr/>
+          <p:nvPr/>
+        </p:nvSpPr>
+        <p:spPr>
+          <a:xfrm>
+            <a:off x="1295400" y="3581400"/>
+            <a:ext cx="381000" cy="1676400"/>
+          </a:xfrm>
+          <a:prstGeom prst="rect">
+            <a:avLst/>
+          </a:prstGeom>
+          <a:solidFill>
+            <a:srgbClr val="B0C6E1"/>
+          </a:solidFill>
+          <a:ln w="12700">
+            <a:noFill/>
+          </a:ln>
+        </p:spPr>
+        <p:style>
+          <a:lnRef idx="2">
+            <a:schemeClr val="accent1">
+              <a:shade val="50000"/>
+            </a:schemeClr>
+          </a:lnRef>
+          <a:fillRef idx="1">
+            <a:schemeClr val="accent1"/>
+          </a:fillRef>
+          <a:effectRef idx="0">
+            <a:schemeClr val="accent1"/>
+          </a:effectRef>
+          <a:fontRef idx="minor">
+            <a:schemeClr val="lt1"/>
+          </a:fontRef>
+        </p:style>
+        <p:txBody>
+          <a:bodyPr rtlCol="0" anchor="ctr"/>
+          <a:lstStyle/>
+          <a:p>
+            <a:endParaRPr lang="en-US">
+              <a:solidFill>
+                <a:srgbClr val="000000"/>
+              </a:solidFill>
+            </a:endParaRPr>
+          </a:p>
+        </p:txBody>
+      </p:sp>
+      <p:sp>
+        <p:nvSpPr>
+          <p:cNvPr id="79" name="Rectangle 78">
+            <a:extLst>
+              <a:ext uri="{FF2B5EF4-FFF2-40B4-BE49-F238E27FC236}">
+                <a16:creationId xmlns:a16="http://schemas.microsoft.com/office/drawing/2014/main" id="{3D5629A0-55CD-4EEB-BE29-B63359C7AC5A}"/>
+              </a:ext>
+            </a:extLst>
+          </p:cNvPr>
+          <p:cNvSpPr/>
+          <p:nvPr/>
+        </p:nvSpPr>
+        <p:spPr>
+          <a:xfrm>
+            <a:off x="533400" y="1905000"/>
+            <a:ext cx="381000" cy="4038600"/>
+          </a:xfrm>
+          <a:prstGeom prst="rect">
+            <a:avLst/>
+          </a:prstGeom>
+          <a:solidFill>
+            <a:srgbClr val="B0C6E1"/>
+          </a:solidFill>
+          <a:ln w="12700">
+            <a:noFill/>
+          </a:ln>
+        </p:spPr>
+        <p:style>
+          <a:lnRef idx="2">
+            <a:schemeClr val="accent1">
+              <a:shade val="50000"/>
+            </a:schemeClr>
+          </a:lnRef>
+          <a:fillRef idx="1">
+            <a:schemeClr val="accent1"/>
+          </a:fillRef>
+          <a:effectRef idx="0">
+            <a:schemeClr val="accent1"/>
+          </a:effectRef>
+          <a:fontRef idx="minor">
+            <a:schemeClr val="lt1"/>
+          </a:fontRef>
+        </p:style>
+        <p:txBody>
+          <a:bodyPr rtlCol="0" anchor="ctr"/>
+          <a:lstStyle/>
+          <a:p>
+            <a:endParaRPr lang="en-US">
+              <a:solidFill>
+                <a:srgbClr val="000000"/>
+              </a:solidFill>
+            </a:endParaRPr>
+          </a:p>
+        </p:txBody>
+      </p:sp>
+      <p:sp>
+        <p:nvSpPr>
+          <p:cNvPr id="80" name="Rectangle 79">
+            <a:extLst>
+              <a:ext uri="{FF2B5EF4-FFF2-40B4-BE49-F238E27FC236}">
+                <a16:creationId xmlns:a16="http://schemas.microsoft.com/office/drawing/2014/main" id="{1EB438D2-118B-4AC7-8396-17EF60C6CA43}"/>
+              </a:ext>
+            </a:extLst>
+          </p:cNvPr>
+          <p:cNvSpPr/>
+          <p:nvPr/>
+        </p:nvSpPr>
+        <p:spPr>
+          <a:xfrm>
+            <a:off x="76200" y="3048000"/>
+            <a:ext cx="1143000" cy="685800"/>
+          </a:xfrm>
+          <a:prstGeom prst="rect">
+            <a:avLst/>
+          </a:prstGeom>
+          <a:solidFill>
+            <a:srgbClr val="B0C6E1"/>
+          </a:solidFill>
+          <a:ln w="12700">
+            <a:noFill/>
+          </a:ln>
+        </p:spPr>
+        <p:style>
+          <a:lnRef idx="2">
+            <a:schemeClr val="accent1">
+              <a:shade val="50000"/>
+            </a:schemeClr>
+          </a:lnRef>
+          <a:fillRef idx="1">
+            <a:schemeClr val="accent1"/>
+          </a:fillRef>
+          <a:effectRef idx="0">
+            <a:schemeClr val="accent1"/>
+          </a:effectRef>
+          <a:fontRef idx="minor">
+            <a:schemeClr val="lt1"/>
+          </a:fontRef>
+        </p:style>
+        <p:txBody>
+          <a:bodyPr rtlCol="0" anchor="ctr"/>
+          <a:lstStyle/>
+          <a:p>
+            <a:endParaRPr lang="en-US" dirty="0">
+              <a:solidFill>
+                <a:srgbClr val="000000"/>
+              </a:solidFill>
+            </a:endParaRPr>
+          </a:p>
+        </p:txBody>
+      </p:sp>
+      <p:sp>
+        <p:nvSpPr>
+          <p:cNvPr id="64" name="Rectangle 63">
+            <a:extLst>
+              <a:ext uri="{FF2B5EF4-FFF2-40B4-BE49-F238E27FC236}">
+                <a16:creationId xmlns:a16="http://schemas.microsoft.com/office/drawing/2014/main" id="{7A9FA661-12AD-47BA-95C7-6CA9D6C2B43D}"/>
+              </a:ext>
+            </a:extLst>
+          </p:cNvPr>
+          <p:cNvSpPr/>
+          <p:nvPr/>
+        </p:nvSpPr>
+        <p:spPr>
+          <a:xfrm>
+            <a:off x="533400" y="1866900"/>
+            <a:ext cx="2019300" cy="304800"/>
+          </a:xfrm>
+          <a:prstGeom prst="rect">
+            <a:avLst/>
+          </a:prstGeom>
+          <a:solidFill>
+            <a:srgbClr val="B0C6E1"/>
+          </a:solidFill>
+          <a:ln w="12700">
+            <a:noFill/>
+          </a:ln>
+        </p:spPr>
+        <p:style>
+          <a:lnRef idx="2">
+            <a:schemeClr val="accent1">
+              <a:shade val="50000"/>
+            </a:schemeClr>
+          </a:lnRef>
+          <a:fillRef idx="1">
+            <a:schemeClr val="accent1"/>
+          </a:fillRef>
+          <a:effectRef idx="0">
+            <a:schemeClr val="accent1"/>
+          </a:effectRef>
+          <a:fontRef idx="minor">
+            <a:schemeClr val="lt1"/>
+          </a:fontRef>
+        </p:style>
+        <p:txBody>
+          <a:bodyPr rtlCol="0" anchor="ctr"/>
+          <a:lstStyle/>
+          <a:p>
+            <a:endParaRPr lang="en-US" dirty="0">
+              <a:solidFill>
+                <a:srgbClr val="000000"/>
+              </a:solidFill>
+            </a:endParaRPr>
+          </a:p>
+        </p:txBody>
+      </p:sp>
+      <p:sp>
+        <p:nvSpPr>
+          <p:cNvPr id="76" name="Rectangle 75">
+            <a:extLst>
+              <a:ext uri="{FF2B5EF4-FFF2-40B4-BE49-F238E27FC236}">
+                <a16:creationId xmlns:a16="http://schemas.microsoft.com/office/drawing/2014/main" id="{43EF6C0C-AB74-462D-BC92-578F345D5EB7}"/>
+              </a:ext>
+            </a:extLst>
+          </p:cNvPr>
+          <p:cNvSpPr/>
+          <p:nvPr/>
+        </p:nvSpPr>
+        <p:spPr>
+          <a:xfrm>
+            <a:off x="533400" y="3924300"/>
+            <a:ext cx="2019300" cy="304800"/>
+          </a:xfrm>
+          <a:prstGeom prst="rect">
+            <a:avLst/>
+          </a:prstGeom>
+          <a:solidFill>
+            <a:srgbClr val="B0C6E1"/>
+          </a:solidFill>
+          <a:ln w="12700">
+            <a:noFill/>
+          </a:ln>
+        </p:spPr>
+        <p:style>
+          <a:lnRef idx="2">
+            <a:schemeClr val="accent1">
+              <a:shade val="50000"/>
+            </a:schemeClr>
+          </a:lnRef>
+          <a:fillRef idx="1">
+            <a:schemeClr val="accent1"/>
+          </a:fillRef>
+          <a:effectRef idx="0">
+            <a:schemeClr val="accent1"/>
+          </a:effectRef>
+          <a:fontRef idx="minor">
+            <a:schemeClr val="lt1"/>
+          </a:fontRef>
+        </p:style>
+        <p:txBody>
+          <a:bodyPr rtlCol="0" anchor="ctr"/>
+          <a:lstStyle/>
+          <a:p>
+            <a:endParaRPr lang="en-US" dirty="0">
+              <a:solidFill>
+                <a:srgbClr val="000000"/>
+              </a:solidFill>
+            </a:endParaRPr>
+          </a:p>
+        </p:txBody>
+      </p:sp>
+      <p:sp>
+        <p:nvSpPr>
+          <p:cNvPr id="52" name="Rectangle 51">
+            <a:extLst>
+              <a:ext uri="{FF2B5EF4-FFF2-40B4-BE49-F238E27FC236}">
+                <a16:creationId xmlns:a16="http://schemas.microsoft.com/office/drawing/2014/main" id="{B1123211-0A47-43F4-B5D5-3C9F0EF3D0E2}"/>
+              </a:ext>
+            </a:extLst>
+          </p:cNvPr>
+          <p:cNvSpPr/>
+          <p:nvPr/>
+        </p:nvSpPr>
+        <p:spPr>
+          <a:xfrm>
+            <a:off x="533400" y="5638800"/>
+            <a:ext cx="8305800" cy="304800"/>
+          </a:xfrm>
+          <a:prstGeom prst="rect">
+            <a:avLst/>
+          </a:prstGeom>
+          <a:solidFill>
+            <a:srgbClr val="B0C6E1"/>
+          </a:solidFill>
+          <a:ln w="12700">
+            <a:noFill/>
+          </a:ln>
+        </p:spPr>
+        <p:style>
+          <a:lnRef idx="2">
+            <a:schemeClr val="accent1">
+              <a:shade val="50000"/>
+            </a:schemeClr>
+          </a:lnRef>
+          <a:fillRef idx="1">
+            <a:schemeClr val="accent1"/>
+          </a:fillRef>
+          <a:effectRef idx="0">
+            <a:schemeClr val="accent1"/>
+          </a:effectRef>
+          <a:fontRef idx="minor">
+            <a:schemeClr val="lt1"/>
+          </a:fontRef>
+        </p:style>
+        <p:txBody>
+          <a:bodyPr rtlCol="0" anchor="ctr"/>
+          <a:lstStyle/>
+          <a:p>
+            <a:endParaRPr lang="en-US" dirty="0">
+              <a:solidFill>
+                <a:srgbClr val="000000"/>
+              </a:solidFill>
+            </a:endParaRPr>
+          </a:p>
+        </p:txBody>
+      </p:sp>
+      <p:sp>
+        <p:nvSpPr>
+          <p:cNvPr id="5" name="Rectangle 4">
+            <a:extLst>
+              <a:ext uri="{FF2B5EF4-FFF2-40B4-BE49-F238E27FC236}">
+                <a16:creationId xmlns:a16="http://schemas.microsoft.com/office/drawing/2014/main" id="{C6706F1E-6D81-4DF0-9BC7-A7D48695D99C}"/>
+              </a:ext>
+            </a:extLst>
+          </p:cNvPr>
+          <p:cNvSpPr/>
+          <p:nvPr/>
+        </p:nvSpPr>
+        <p:spPr>
+          <a:xfrm>
+            <a:off x="1295400" y="1524000"/>
+            <a:ext cx="7543800" cy="304800"/>
+          </a:xfrm>
+          <a:prstGeom prst="rect">
+            <a:avLst/>
+          </a:prstGeom>
+          <a:solidFill>
+            <a:srgbClr val="B0C6E1"/>
+          </a:solidFill>
+          <a:ln w="12700">
+            <a:noFill/>
+          </a:ln>
+        </p:spPr>
+        <p:style>
+          <a:lnRef idx="2">
+            <a:schemeClr val="accent1">
+              <a:shade val="50000"/>
+            </a:schemeClr>
+          </a:lnRef>
+          <a:fillRef idx="1">
+            <a:schemeClr val="accent1"/>
+          </a:fillRef>
+          <a:effectRef idx="0">
+            <a:schemeClr val="accent1"/>
+          </a:effectRef>
+          <a:fontRef idx="minor">
+            <a:schemeClr val="lt1"/>
+          </a:fontRef>
+        </p:style>
+        <p:txBody>
+          <a:bodyPr rtlCol="0" anchor="ctr"/>
+          <a:lstStyle/>
+          <a:p>
+            <a:endParaRPr lang="en-US" dirty="0">
+              <a:solidFill>
+                <a:srgbClr val="000000"/>
+              </a:solidFill>
+            </a:endParaRPr>
+          </a:p>
+        </p:txBody>
+      </p:sp>
+      <p:sp>
+        <p:nvSpPr>
+          <p:cNvPr id="47" name="Rectangle 46">
+            <a:extLst>
+              <a:ext uri="{FF2B5EF4-FFF2-40B4-BE49-F238E27FC236}">
+                <a16:creationId xmlns:a16="http://schemas.microsoft.com/office/drawing/2014/main" id="{D13E14B6-C5F9-4921-B47A-A713D13FD3B7}"/>
+              </a:ext>
+            </a:extLst>
+          </p:cNvPr>
+          <p:cNvSpPr/>
+          <p:nvPr/>
+        </p:nvSpPr>
+        <p:spPr>
+          <a:xfrm>
+            <a:off x="1295400" y="2209800"/>
+            <a:ext cx="7543800" cy="304800"/>
+          </a:xfrm>
+          <a:prstGeom prst="rect">
+            <a:avLst/>
+          </a:prstGeom>
+          <a:solidFill>
+            <a:srgbClr val="B0C6E1"/>
+          </a:solidFill>
+          <a:ln w="12700">
+            <a:noFill/>
+          </a:ln>
+        </p:spPr>
+        <p:style>
+          <a:lnRef idx="2">
+            <a:schemeClr val="accent1">
+              <a:shade val="50000"/>
+            </a:schemeClr>
+          </a:lnRef>
+          <a:fillRef idx="1">
+            <a:schemeClr val="accent1"/>
+          </a:fillRef>
+          <a:effectRef idx="0">
+            <a:schemeClr val="accent1"/>
+          </a:effectRef>
+          <a:fontRef idx="minor">
+            <a:schemeClr val="lt1"/>
+          </a:fontRef>
+        </p:style>
+        <p:txBody>
+          <a:bodyPr rtlCol="0" anchor="ctr"/>
+          <a:lstStyle/>
+          <a:p>
+            <a:endParaRPr lang="en-US" dirty="0">
+              <a:solidFill>
+                <a:srgbClr val="000000"/>
+              </a:solidFill>
+            </a:endParaRPr>
+          </a:p>
+        </p:txBody>
+      </p:sp>
+      <p:sp>
+        <p:nvSpPr>
+          <p:cNvPr id="48" name="Rectangle 47">
+            <a:extLst>
+              <a:ext uri="{FF2B5EF4-FFF2-40B4-BE49-F238E27FC236}">
+                <a16:creationId xmlns:a16="http://schemas.microsoft.com/office/drawing/2014/main" id="{1E322921-DE60-4BFF-8CC0-986B6AC17011}"/>
+              </a:ext>
+            </a:extLst>
+          </p:cNvPr>
+          <p:cNvSpPr/>
+          <p:nvPr/>
+        </p:nvSpPr>
+        <p:spPr>
+          <a:xfrm>
+            <a:off x="1295400" y="2895600"/>
+            <a:ext cx="7543800" cy="304800"/>
+          </a:xfrm>
+          <a:prstGeom prst="rect">
+            <a:avLst/>
+          </a:prstGeom>
+          <a:solidFill>
+            <a:srgbClr val="B0C6E1"/>
+          </a:solidFill>
+          <a:ln w="12700">
+            <a:noFill/>
+          </a:ln>
+        </p:spPr>
+        <p:style>
+          <a:lnRef idx="2">
+            <a:schemeClr val="accent1">
+              <a:shade val="50000"/>
+            </a:schemeClr>
+          </a:lnRef>
+          <a:fillRef idx="1">
+            <a:schemeClr val="accent1"/>
+          </a:fillRef>
+          <a:effectRef idx="0">
+            <a:schemeClr val="accent1"/>
+          </a:effectRef>
+          <a:fontRef idx="minor">
+            <a:schemeClr val="lt1"/>
+          </a:fontRef>
+        </p:style>
+        <p:txBody>
+          <a:bodyPr rtlCol="0" anchor="ctr"/>
+          <a:lstStyle/>
+          <a:p>
+            <a:endParaRPr lang="en-US" dirty="0">
+              <a:solidFill>
+                <a:srgbClr val="000000"/>
+              </a:solidFill>
+            </a:endParaRPr>
+          </a:p>
+        </p:txBody>
+      </p:sp>
+      <p:sp>
+        <p:nvSpPr>
+          <p:cNvPr id="49" name="Rectangle 48">
+            <a:extLst>
+              <a:ext uri="{FF2B5EF4-FFF2-40B4-BE49-F238E27FC236}">
+                <a16:creationId xmlns:a16="http://schemas.microsoft.com/office/drawing/2014/main" id="{023F9A62-05F9-40BE-AA6B-1C5957F11095}"/>
+              </a:ext>
+            </a:extLst>
+          </p:cNvPr>
+          <p:cNvSpPr/>
+          <p:nvPr/>
+        </p:nvSpPr>
+        <p:spPr>
+          <a:xfrm>
+            <a:off x="1295400" y="3581400"/>
+            <a:ext cx="7543800" cy="304800"/>
+          </a:xfrm>
+          <a:prstGeom prst="rect">
+            <a:avLst/>
+          </a:prstGeom>
+          <a:solidFill>
+            <a:srgbClr val="B0C6E1"/>
+          </a:solidFill>
+          <a:ln w="12700">
+            <a:noFill/>
+          </a:ln>
+        </p:spPr>
+        <p:style>
+          <a:lnRef idx="2">
+            <a:schemeClr val="accent1">
+              <a:shade val="50000"/>
+            </a:schemeClr>
+          </a:lnRef>
+          <a:fillRef idx="1">
+            <a:schemeClr val="accent1"/>
+          </a:fillRef>
+          <a:effectRef idx="0">
+            <a:schemeClr val="accent1"/>
+          </a:effectRef>
+          <a:fontRef idx="minor">
+            <a:schemeClr val="lt1"/>
+          </a:fontRef>
+        </p:style>
+        <p:txBody>
+          <a:bodyPr rtlCol="0" anchor="ctr"/>
+          <a:lstStyle/>
+          <a:p>
+            <a:endParaRPr lang="en-US" dirty="0">
+              <a:solidFill>
+                <a:srgbClr val="000000"/>
+              </a:solidFill>
+            </a:endParaRPr>
+          </a:p>
+        </p:txBody>
+      </p:sp>
+      <p:sp>
+        <p:nvSpPr>
+          <p:cNvPr id="50" name="Rectangle 49">
+            <a:extLst>
+              <a:ext uri="{FF2B5EF4-FFF2-40B4-BE49-F238E27FC236}">
+                <a16:creationId xmlns:a16="http://schemas.microsoft.com/office/drawing/2014/main" id="{52A7FFFF-E53C-403B-B0ED-69F1EC5063D2}"/>
+              </a:ext>
+            </a:extLst>
+          </p:cNvPr>
+          <p:cNvSpPr/>
+          <p:nvPr/>
+        </p:nvSpPr>
+        <p:spPr>
+          <a:xfrm>
+            <a:off x="1295400" y="4267200"/>
+            <a:ext cx="7543800" cy="304800"/>
+          </a:xfrm>
+          <a:prstGeom prst="rect">
+            <a:avLst/>
+          </a:prstGeom>
+          <a:solidFill>
+            <a:srgbClr val="B0C6E1"/>
+          </a:solidFill>
+          <a:ln w="12700">
+            <a:noFill/>
+          </a:ln>
+        </p:spPr>
+        <p:style>
+          <a:lnRef idx="2">
+            <a:schemeClr val="accent1">
+              <a:shade val="50000"/>
+            </a:schemeClr>
+          </a:lnRef>
+          <a:fillRef idx="1">
+            <a:schemeClr val="accent1"/>
+          </a:fillRef>
+          <a:effectRef idx="0">
+            <a:schemeClr val="accent1"/>
+          </a:effectRef>
+          <a:fontRef idx="minor">
+            <a:schemeClr val="lt1"/>
+          </a:fontRef>
+        </p:style>
+        <p:txBody>
+          <a:bodyPr rtlCol="0" anchor="ctr"/>
+          <a:lstStyle/>
+          <a:p>
+            <a:endParaRPr lang="en-US" dirty="0">
+              <a:solidFill>
+                <a:srgbClr val="000000"/>
+              </a:solidFill>
+            </a:endParaRPr>
+          </a:p>
+        </p:txBody>
+      </p:sp>
+      <p:sp>
+        <p:nvSpPr>
+          <p:cNvPr id="51" name="Rectangle 50">
+            <a:extLst>
+              <a:ext uri="{FF2B5EF4-FFF2-40B4-BE49-F238E27FC236}">
+                <a16:creationId xmlns:a16="http://schemas.microsoft.com/office/drawing/2014/main" id="{3BC8B312-6F15-4C38-8B7E-F2588749B397}"/>
+              </a:ext>
+            </a:extLst>
+          </p:cNvPr>
+          <p:cNvSpPr/>
+          <p:nvPr/>
+        </p:nvSpPr>
+        <p:spPr>
+          <a:xfrm>
+            <a:off x="1295400" y="4953000"/>
+            <a:ext cx="7543800" cy="304800"/>
+          </a:xfrm>
+          <a:prstGeom prst="rect">
+            <a:avLst/>
+          </a:prstGeom>
+          <a:solidFill>
+            <a:srgbClr val="B0C6E1"/>
+          </a:solidFill>
+          <a:ln w="12700">
+            <a:noFill/>
+          </a:ln>
+        </p:spPr>
+        <p:style>
+          <a:lnRef idx="2">
+            <a:schemeClr val="accent1">
+              <a:shade val="50000"/>
+            </a:schemeClr>
+          </a:lnRef>
+          <a:fillRef idx="1">
+            <a:schemeClr val="accent1"/>
+          </a:fillRef>
+          <a:effectRef idx="0">
+            <a:schemeClr val="accent1"/>
+          </a:effectRef>
+          <a:fontRef idx="minor">
+            <a:schemeClr val="lt1"/>
+          </a:fontRef>
+        </p:style>
+        <p:txBody>
+          <a:bodyPr rtlCol="0" anchor="ctr"/>
+          <a:lstStyle/>
+          <a:p>
+            <a:endParaRPr lang="en-US" dirty="0">
+              <a:solidFill>
+                <a:srgbClr val="000000"/>
+              </a:solidFill>
+            </a:endParaRPr>
+          </a:p>
+        </p:txBody>
+      </p:sp>
+      <p:sp>
+        <p:nvSpPr>
+          <p:cNvPr id="2" name="Rectangle 1"/>
+          <p:cNvSpPr/>
+          <p:nvPr/>
+        </p:nvSpPr>
+        <p:spPr>
+          <a:xfrm>
+            <a:off x="4495800" y="73460"/>
+            <a:ext cx="762000" cy="5946340"/>
+          </a:xfrm>
+          <a:prstGeom prst="rect">
+            <a:avLst/>
+          </a:prstGeom>
+          <a:solidFill>
+            <a:srgbClr val="C0504D">
+              <a:alpha val="40000"/>
+            </a:srgbClr>
+          </a:solidFill>
+          <a:ln>
+            <a:noFill/>
+          </a:ln>
+        </p:spPr>
+        <p:style>
+          <a:lnRef idx="2">
+            <a:schemeClr val="accent1">
+              <a:shade val="50000"/>
+            </a:schemeClr>
+          </a:lnRef>
+          <a:fillRef idx="1">
+            <a:schemeClr val="accent1"/>
+          </a:fillRef>
+          <a:effectRef idx="0">
+            <a:schemeClr val="accent1"/>
+          </a:effectRef>
+          <a:fontRef idx="minor">
+            <a:schemeClr val="lt1"/>
+          </a:fontRef>
+        </p:style>
+        <p:txBody>
+          <a:bodyPr vert="vert" rtlCol="0" anchor="ctr"/>
+          <a:lstStyle/>
+          <a:p>
+            <a:endParaRPr lang="en-US" dirty="0">
+              <a:solidFill>
+                <a:schemeClr val="tx1"/>
+              </a:solidFill>
+            </a:endParaRPr>
+          </a:p>
+        </p:txBody>
+      </p:sp>
+      <p:sp>
+        <p:nvSpPr>
+          <p:cNvPr id="54" name="Rectangle 53"/>
+          <p:cNvSpPr/>
+          <p:nvPr/>
+        </p:nvSpPr>
+        <p:spPr>
+          <a:xfrm>
+            <a:off x="5638800" y="73460"/>
+            <a:ext cx="762000" cy="5946340"/>
+          </a:xfrm>
+          <a:prstGeom prst="rect">
+            <a:avLst/>
+          </a:prstGeom>
+          <a:solidFill>
+            <a:srgbClr val="C0504D">
+              <a:alpha val="40000"/>
+            </a:srgbClr>
+          </a:solidFill>
+          <a:ln>
+            <a:noFill/>
+          </a:ln>
+        </p:spPr>
+        <p:style>
+          <a:lnRef idx="2">
+            <a:schemeClr val="accent1">
+              <a:shade val="50000"/>
+            </a:schemeClr>
+          </a:lnRef>
+          <a:fillRef idx="1">
+            <a:schemeClr val="accent1"/>
+          </a:fillRef>
+          <a:effectRef idx="0">
+            <a:schemeClr val="accent1"/>
+          </a:effectRef>
+          <a:fontRef idx="minor">
+            <a:schemeClr val="lt1"/>
+          </a:fontRef>
+        </p:style>
+        <p:txBody>
+          <a:bodyPr vert="vert" rtlCol="0" anchor="ctr"/>
+          <a:lstStyle/>
+          <a:p>
+            <a:endParaRPr lang="en-US" dirty="0">
+              <a:solidFill>
+                <a:schemeClr val="tx1"/>
+              </a:solidFill>
+            </a:endParaRPr>
+          </a:p>
+        </p:txBody>
+      </p:sp>
+      <p:sp>
+        <p:nvSpPr>
+          <p:cNvPr id="56" name="Rectangle 55"/>
+          <p:cNvSpPr/>
+          <p:nvPr/>
+        </p:nvSpPr>
+        <p:spPr>
+          <a:xfrm>
+            <a:off x="7924800" y="73460"/>
+            <a:ext cx="761999" cy="5946340"/>
+          </a:xfrm>
+          <a:prstGeom prst="rect">
+            <a:avLst/>
+          </a:prstGeom>
+          <a:solidFill>
+            <a:srgbClr val="C0504D">
+              <a:alpha val="40000"/>
+            </a:srgbClr>
+          </a:solidFill>
+          <a:ln>
+            <a:noFill/>
+          </a:ln>
+        </p:spPr>
+        <p:style>
+          <a:lnRef idx="2">
+            <a:schemeClr val="accent1">
+              <a:shade val="50000"/>
+            </a:schemeClr>
+          </a:lnRef>
+          <a:fillRef idx="1">
+            <a:schemeClr val="accent1"/>
+          </a:fillRef>
+          <a:effectRef idx="0">
+            <a:schemeClr val="accent1"/>
+          </a:effectRef>
+          <a:fontRef idx="minor">
+            <a:schemeClr val="lt1"/>
+          </a:fontRef>
+        </p:style>
+        <p:txBody>
+          <a:bodyPr vert="vert" rtlCol="0" anchor="ctr"/>
+          <a:lstStyle/>
+          <a:p>
+            <a:endParaRPr lang="en-US" dirty="0">
+              <a:solidFill>
+                <a:schemeClr val="tx1"/>
+              </a:solidFill>
+            </a:endParaRPr>
+          </a:p>
+        </p:txBody>
+      </p:sp>
+      <p:sp>
+        <p:nvSpPr>
+          <p:cNvPr id="58" name="Rectangle 57"/>
+          <p:cNvSpPr/>
+          <p:nvPr/>
+        </p:nvSpPr>
+        <p:spPr>
+          <a:xfrm>
+            <a:off x="6781800" y="73460"/>
+            <a:ext cx="761999" cy="5946340"/>
+          </a:xfrm>
+          <a:prstGeom prst="rect">
+            <a:avLst/>
+          </a:prstGeom>
+          <a:solidFill>
+            <a:srgbClr val="C0504D">
+              <a:alpha val="40000"/>
+            </a:srgbClr>
+          </a:solidFill>
+          <a:ln>
+            <a:noFill/>
+          </a:ln>
+        </p:spPr>
+        <p:style>
+          <a:lnRef idx="2">
+            <a:schemeClr val="accent1">
+              <a:shade val="50000"/>
+            </a:schemeClr>
+          </a:lnRef>
+          <a:fillRef idx="1">
+            <a:schemeClr val="accent1"/>
+          </a:fillRef>
+          <a:effectRef idx="0">
+            <a:schemeClr val="accent1"/>
+          </a:effectRef>
+          <a:fontRef idx="minor">
+            <a:schemeClr val="lt1"/>
+          </a:fontRef>
+        </p:style>
+        <p:txBody>
+          <a:bodyPr vert="vert" rtlCol="0" anchor="ctr"/>
+          <a:lstStyle/>
+          <a:p>
+            <a:endParaRPr lang="en-US" dirty="0">
+              <a:solidFill>
+                <a:schemeClr val="tx1"/>
+              </a:solidFill>
+            </a:endParaRPr>
+          </a:p>
+        </p:txBody>
+      </p:sp>
+      <p:sp>
+        <p:nvSpPr>
+          <p:cNvPr id="19" name="Rounded Rectangle 20">
+            <a:extLst>
+              <a:ext uri="{FF2B5EF4-FFF2-40B4-BE49-F238E27FC236}">
+                <a16:creationId xmlns:a16="http://schemas.microsoft.com/office/drawing/2014/main" id="{56EC7F24-2D34-447D-8974-9C6E63F3F1B7}"/>
+              </a:ext>
+            </a:extLst>
+          </p:cNvPr>
+          <p:cNvSpPr/>
+          <p:nvPr/>
+        </p:nvSpPr>
+        <p:spPr>
+          <a:xfrm>
+            <a:off x="4343400" y="4800600"/>
+            <a:ext cx="3352800" cy="609600"/>
+          </a:xfrm>
+          <a:prstGeom prst="roundRect">
+            <a:avLst/>
+          </a:prstGeom>
+          <a:solidFill>
+            <a:schemeClr val="accent2">
+              <a:lumMod val="75000"/>
+            </a:schemeClr>
+          </a:solidFill>
+          <a:ln w="12700">
+            <a:solidFill>
+              <a:schemeClr val="tx1"/>
+            </a:solidFill>
+          </a:ln>
+        </p:spPr>
+        <p:style>
+          <a:lnRef idx="2">
+            <a:schemeClr val="accent1">
+              <a:shade val="50000"/>
+            </a:schemeClr>
+          </a:lnRef>
+          <a:fillRef idx="1">
+            <a:schemeClr val="accent1"/>
+          </a:fillRef>
+          <a:effectRef idx="0">
+            <a:schemeClr val="accent1"/>
+          </a:effectRef>
+          <a:fontRef idx="minor">
+            <a:schemeClr val="lt1"/>
+          </a:fontRef>
+        </p:style>
+        <p:txBody>
+          <a:bodyPr wrap="square" lIns="45720" tIns="0" rIns="9144" bIns="0" rtlCol="0" anchor="b" anchorCtr="0"/>
+          <a:lstStyle/>
+          <a:p>
+            <a:endParaRPr lang="en-US" sz="1400" dirty="0">
+              <a:solidFill>
+                <a:schemeClr val="tx1"/>
+              </a:solidFill>
+            </a:endParaRPr>
+          </a:p>
+        </p:txBody>
+      </p:sp>
+    </p:spTree>
+    <p:extLst>
+      <p:ext uri="{BB962C8B-B14F-4D97-AF65-F5344CB8AC3E}">
+        <p14:creationId xmlns:p14="http://schemas.microsoft.com/office/powerpoint/2010/main" val="3607784036"/>
+      </p:ext>
+    </p:extLst>
+  </p:cSld>
+  <p:clrMapOvr>
+    <a:masterClrMapping/>
+  </p:clrMapOvr>
+</p:sld>
+</file>
+
+<file path=ppt/slides/slide8.xml><?xml version="1.0" encoding="utf-8"?>
+<p:sld xmlns:a="http://schemas.openxmlformats.org/drawingml/2006/main" xmlns:r="http://schemas.openxmlformats.org/officeDocument/2006/relationships" xmlns:p="http://schemas.openxmlformats.org/presentationml/2006/main">
+  <p:cSld>
+    <p:spTree>
+      <p:nvGrpSpPr>
+        <p:cNvPr id="1" name=""/>
+        <p:cNvGrpSpPr/>
+        <p:nvPr/>
+      </p:nvGrpSpPr>
+      <p:grpSpPr>
+        <a:xfrm>
+          <a:off x="0" y="0"/>
+          <a:ext cx="0" cy="0"/>
+          <a:chOff x="0" y="0"/>
+          <a:chExt cx="0" cy="0"/>
+        </a:xfrm>
+      </p:grpSpPr>
+      <p:sp>
+        <p:nvSpPr>
+          <p:cNvPr id="77" name="Rectangle 76">
+            <a:extLst>
+              <a:ext uri="{FF2B5EF4-FFF2-40B4-BE49-F238E27FC236}">
+                <a16:creationId xmlns:a16="http://schemas.microsoft.com/office/drawing/2014/main" id="{33E03DD4-58B8-4D84-81B8-890E74C1E17A}"/>
+              </a:ext>
+            </a:extLst>
+          </p:cNvPr>
+          <p:cNvSpPr/>
+          <p:nvPr/>
+        </p:nvSpPr>
+        <p:spPr>
+          <a:xfrm>
+            <a:off x="1295400" y="1524000"/>
+            <a:ext cx="381000" cy="1676400"/>
+          </a:xfrm>
+          <a:prstGeom prst="rect">
+            <a:avLst/>
+          </a:prstGeom>
+          <a:solidFill>
+            <a:srgbClr val="B0C6E1"/>
+          </a:solidFill>
+          <a:ln w="12700">
+            <a:noFill/>
+          </a:ln>
+        </p:spPr>
+        <p:style>
+          <a:lnRef idx="2">
+            <a:schemeClr val="accent1">
+              <a:shade val="50000"/>
+            </a:schemeClr>
+          </a:lnRef>
+          <a:fillRef idx="1">
+            <a:schemeClr val="accent1"/>
+          </a:fillRef>
+          <a:effectRef idx="0">
+            <a:schemeClr val="accent1"/>
+          </a:effectRef>
+          <a:fontRef idx="minor">
+            <a:schemeClr val="lt1"/>
+          </a:fontRef>
+        </p:style>
+        <p:txBody>
+          <a:bodyPr rtlCol="0" anchor="ctr"/>
+          <a:lstStyle/>
+          <a:p>
+            <a:endParaRPr lang="en-US">
+              <a:solidFill>
+                <a:srgbClr val="000000"/>
+              </a:solidFill>
+            </a:endParaRPr>
+          </a:p>
+        </p:txBody>
+      </p:sp>
+      <p:sp>
+        <p:nvSpPr>
+          <p:cNvPr id="78" name="Rectangle 77">
+            <a:extLst>
+              <a:ext uri="{FF2B5EF4-FFF2-40B4-BE49-F238E27FC236}">
+                <a16:creationId xmlns:a16="http://schemas.microsoft.com/office/drawing/2014/main" id="{5A6BABA4-FFD3-46EC-8366-B18DEE47420B}"/>
+              </a:ext>
+            </a:extLst>
+          </p:cNvPr>
+          <p:cNvSpPr/>
+          <p:nvPr/>
+        </p:nvSpPr>
+        <p:spPr>
+          <a:xfrm>
+            <a:off x="1295400" y="3581400"/>
+            <a:ext cx="381000" cy="1676400"/>
+          </a:xfrm>
+          <a:prstGeom prst="rect">
+            <a:avLst/>
+          </a:prstGeom>
+          <a:solidFill>
+            <a:srgbClr val="B0C6E1"/>
+          </a:solidFill>
+          <a:ln w="12700">
+            <a:noFill/>
+          </a:ln>
+        </p:spPr>
+        <p:style>
+          <a:lnRef idx="2">
+            <a:schemeClr val="accent1">
+              <a:shade val="50000"/>
+            </a:schemeClr>
+          </a:lnRef>
+          <a:fillRef idx="1">
+            <a:schemeClr val="accent1"/>
+          </a:fillRef>
+          <a:effectRef idx="0">
+            <a:schemeClr val="accent1"/>
+          </a:effectRef>
+          <a:fontRef idx="minor">
+            <a:schemeClr val="lt1"/>
+          </a:fontRef>
+        </p:style>
+        <p:txBody>
+          <a:bodyPr rtlCol="0" anchor="ctr"/>
+          <a:lstStyle/>
+          <a:p>
+            <a:endParaRPr lang="en-US">
+              <a:solidFill>
+                <a:srgbClr val="000000"/>
+              </a:solidFill>
+            </a:endParaRPr>
+          </a:p>
+        </p:txBody>
+      </p:sp>
+      <p:sp>
+        <p:nvSpPr>
+          <p:cNvPr id="79" name="Rectangle 78">
+            <a:extLst>
+              <a:ext uri="{FF2B5EF4-FFF2-40B4-BE49-F238E27FC236}">
+                <a16:creationId xmlns:a16="http://schemas.microsoft.com/office/drawing/2014/main" id="{3D5629A0-55CD-4EEB-BE29-B63359C7AC5A}"/>
+              </a:ext>
+            </a:extLst>
+          </p:cNvPr>
+          <p:cNvSpPr/>
+          <p:nvPr/>
+        </p:nvSpPr>
+        <p:spPr>
+          <a:xfrm>
+            <a:off x="533400" y="1905000"/>
+            <a:ext cx="381000" cy="4038600"/>
+          </a:xfrm>
+          <a:prstGeom prst="rect">
+            <a:avLst/>
+          </a:prstGeom>
+          <a:solidFill>
+            <a:srgbClr val="B0C6E1"/>
+          </a:solidFill>
+          <a:ln w="12700">
+            <a:noFill/>
+          </a:ln>
+        </p:spPr>
+        <p:style>
+          <a:lnRef idx="2">
+            <a:schemeClr val="accent1">
+              <a:shade val="50000"/>
+            </a:schemeClr>
+          </a:lnRef>
+          <a:fillRef idx="1">
+            <a:schemeClr val="accent1"/>
+          </a:fillRef>
+          <a:effectRef idx="0">
+            <a:schemeClr val="accent1"/>
+          </a:effectRef>
+          <a:fontRef idx="minor">
+            <a:schemeClr val="lt1"/>
+          </a:fontRef>
+        </p:style>
+        <p:txBody>
+          <a:bodyPr rtlCol="0" anchor="ctr"/>
+          <a:lstStyle/>
+          <a:p>
+            <a:endParaRPr lang="en-US">
+              <a:solidFill>
+                <a:srgbClr val="000000"/>
+              </a:solidFill>
+            </a:endParaRPr>
+          </a:p>
+        </p:txBody>
+      </p:sp>
+      <p:sp>
+        <p:nvSpPr>
+          <p:cNvPr id="80" name="Rectangle 79">
+            <a:extLst>
+              <a:ext uri="{FF2B5EF4-FFF2-40B4-BE49-F238E27FC236}">
+                <a16:creationId xmlns:a16="http://schemas.microsoft.com/office/drawing/2014/main" id="{1EB438D2-118B-4AC7-8396-17EF60C6CA43}"/>
+              </a:ext>
+            </a:extLst>
+          </p:cNvPr>
+          <p:cNvSpPr/>
+          <p:nvPr/>
+        </p:nvSpPr>
+        <p:spPr>
+          <a:xfrm>
+            <a:off x="76200" y="3048000"/>
+            <a:ext cx="1143000" cy="685800"/>
+          </a:xfrm>
+          <a:prstGeom prst="rect">
+            <a:avLst/>
+          </a:prstGeom>
+          <a:solidFill>
+            <a:srgbClr val="B0C6E1"/>
+          </a:solidFill>
+          <a:ln w="12700">
+            <a:noFill/>
+          </a:ln>
+        </p:spPr>
+        <p:style>
+          <a:lnRef idx="2">
+            <a:schemeClr val="accent1">
+              <a:shade val="50000"/>
+            </a:schemeClr>
+          </a:lnRef>
+          <a:fillRef idx="1">
+            <a:schemeClr val="accent1"/>
+          </a:fillRef>
+          <a:effectRef idx="0">
+            <a:schemeClr val="accent1"/>
+          </a:effectRef>
+          <a:fontRef idx="minor">
+            <a:schemeClr val="lt1"/>
+          </a:fontRef>
+        </p:style>
+        <p:txBody>
+          <a:bodyPr rtlCol="0" anchor="ctr"/>
+          <a:lstStyle/>
+          <a:p>
+            <a:endParaRPr lang="en-US" dirty="0">
+              <a:solidFill>
+                <a:srgbClr val="000000"/>
+              </a:solidFill>
+            </a:endParaRPr>
+          </a:p>
+        </p:txBody>
+      </p:sp>
+      <p:sp>
+        <p:nvSpPr>
+          <p:cNvPr id="64" name="Rectangle 63">
+            <a:extLst>
+              <a:ext uri="{FF2B5EF4-FFF2-40B4-BE49-F238E27FC236}">
+                <a16:creationId xmlns:a16="http://schemas.microsoft.com/office/drawing/2014/main" id="{7A9FA661-12AD-47BA-95C7-6CA9D6C2B43D}"/>
+              </a:ext>
+            </a:extLst>
+          </p:cNvPr>
+          <p:cNvSpPr/>
+          <p:nvPr/>
+        </p:nvSpPr>
+        <p:spPr>
+          <a:xfrm>
+            <a:off x="533400" y="1866900"/>
+            <a:ext cx="2019300" cy="304800"/>
+          </a:xfrm>
+          <a:prstGeom prst="rect">
+            <a:avLst/>
+          </a:prstGeom>
+          <a:solidFill>
+            <a:srgbClr val="B0C6E1"/>
+          </a:solidFill>
+          <a:ln w="12700">
+            <a:noFill/>
+          </a:ln>
+        </p:spPr>
+        <p:style>
+          <a:lnRef idx="2">
+            <a:schemeClr val="accent1">
+              <a:shade val="50000"/>
+            </a:schemeClr>
+          </a:lnRef>
+          <a:fillRef idx="1">
+            <a:schemeClr val="accent1"/>
+          </a:fillRef>
+          <a:effectRef idx="0">
+            <a:schemeClr val="accent1"/>
+          </a:effectRef>
+          <a:fontRef idx="minor">
+            <a:schemeClr val="lt1"/>
+          </a:fontRef>
+        </p:style>
+        <p:txBody>
+          <a:bodyPr rtlCol="0" anchor="ctr"/>
+          <a:lstStyle/>
+          <a:p>
+            <a:endParaRPr lang="en-US" dirty="0">
+              <a:solidFill>
+                <a:srgbClr val="000000"/>
+              </a:solidFill>
+            </a:endParaRPr>
+          </a:p>
+        </p:txBody>
+      </p:sp>
+      <p:sp>
+        <p:nvSpPr>
+          <p:cNvPr id="76" name="Rectangle 75">
+            <a:extLst>
+              <a:ext uri="{FF2B5EF4-FFF2-40B4-BE49-F238E27FC236}">
+                <a16:creationId xmlns:a16="http://schemas.microsoft.com/office/drawing/2014/main" id="{43EF6C0C-AB74-462D-BC92-578F345D5EB7}"/>
+              </a:ext>
+            </a:extLst>
+          </p:cNvPr>
+          <p:cNvSpPr/>
+          <p:nvPr/>
+        </p:nvSpPr>
+        <p:spPr>
+          <a:xfrm>
+            <a:off x="533400" y="3924300"/>
+            <a:ext cx="2019300" cy="304800"/>
+          </a:xfrm>
+          <a:prstGeom prst="rect">
+            <a:avLst/>
+          </a:prstGeom>
+          <a:solidFill>
+            <a:srgbClr val="B0C6E1"/>
+          </a:solidFill>
+          <a:ln w="12700">
+            <a:noFill/>
+          </a:ln>
+        </p:spPr>
+        <p:style>
+          <a:lnRef idx="2">
+            <a:schemeClr val="accent1">
+              <a:shade val="50000"/>
+            </a:schemeClr>
+          </a:lnRef>
+          <a:fillRef idx="1">
+            <a:schemeClr val="accent1"/>
+          </a:fillRef>
+          <a:effectRef idx="0">
+            <a:schemeClr val="accent1"/>
+          </a:effectRef>
+          <a:fontRef idx="minor">
+            <a:schemeClr val="lt1"/>
+          </a:fontRef>
+        </p:style>
+        <p:txBody>
+          <a:bodyPr rtlCol="0" anchor="ctr"/>
+          <a:lstStyle/>
+          <a:p>
+            <a:endParaRPr lang="en-US" dirty="0">
+              <a:solidFill>
+                <a:srgbClr val="000000"/>
+              </a:solidFill>
+            </a:endParaRPr>
+          </a:p>
+        </p:txBody>
+      </p:sp>
+      <p:sp>
+        <p:nvSpPr>
+          <p:cNvPr id="52" name="Rectangle 51">
+            <a:extLst>
+              <a:ext uri="{FF2B5EF4-FFF2-40B4-BE49-F238E27FC236}">
+                <a16:creationId xmlns:a16="http://schemas.microsoft.com/office/drawing/2014/main" id="{B1123211-0A47-43F4-B5D5-3C9F0EF3D0E2}"/>
+              </a:ext>
+            </a:extLst>
+          </p:cNvPr>
+          <p:cNvSpPr/>
+          <p:nvPr/>
+        </p:nvSpPr>
+        <p:spPr>
+          <a:xfrm>
+            <a:off x="533400" y="5638800"/>
+            <a:ext cx="8305800" cy="304800"/>
+          </a:xfrm>
+          <a:prstGeom prst="rect">
+            <a:avLst/>
+          </a:prstGeom>
+          <a:solidFill>
+            <a:srgbClr val="B0C6E1"/>
+          </a:solidFill>
+          <a:ln w="12700">
+            <a:noFill/>
+          </a:ln>
+        </p:spPr>
+        <p:style>
+          <a:lnRef idx="2">
+            <a:schemeClr val="accent1">
+              <a:shade val="50000"/>
+            </a:schemeClr>
+          </a:lnRef>
+          <a:fillRef idx="1">
+            <a:schemeClr val="accent1"/>
+          </a:fillRef>
+          <a:effectRef idx="0">
+            <a:schemeClr val="accent1"/>
+          </a:effectRef>
+          <a:fontRef idx="minor">
+            <a:schemeClr val="lt1"/>
+          </a:fontRef>
+        </p:style>
+        <p:txBody>
+          <a:bodyPr rtlCol="0" anchor="ctr"/>
+          <a:lstStyle/>
+          <a:p>
+            <a:endParaRPr lang="en-US" dirty="0">
+              <a:solidFill>
+                <a:srgbClr val="000000"/>
+              </a:solidFill>
+            </a:endParaRPr>
+          </a:p>
+        </p:txBody>
+      </p:sp>
+      <p:sp>
+        <p:nvSpPr>
+          <p:cNvPr id="5" name="Rectangle 4">
+            <a:extLst>
+              <a:ext uri="{FF2B5EF4-FFF2-40B4-BE49-F238E27FC236}">
+                <a16:creationId xmlns:a16="http://schemas.microsoft.com/office/drawing/2014/main" id="{C6706F1E-6D81-4DF0-9BC7-A7D48695D99C}"/>
+              </a:ext>
+            </a:extLst>
+          </p:cNvPr>
+          <p:cNvSpPr/>
+          <p:nvPr/>
+        </p:nvSpPr>
+        <p:spPr>
+          <a:xfrm>
+            <a:off x="1295400" y="1524000"/>
+            <a:ext cx="7543800" cy="304800"/>
+          </a:xfrm>
+          <a:prstGeom prst="rect">
+            <a:avLst/>
+          </a:prstGeom>
+          <a:solidFill>
+            <a:srgbClr val="B0C6E1"/>
+          </a:solidFill>
+          <a:ln w="12700">
+            <a:noFill/>
+          </a:ln>
+        </p:spPr>
+        <p:style>
+          <a:lnRef idx="2">
+            <a:schemeClr val="accent1">
+              <a:shade val="50000"/>
+            </a:schemeClr>
+          </a:lnRef>
+          <a:fillRef idx="1">
+            <a:schemeClr val="accent1"/>
+          </a:fillRef>
+          <a:effectRef idx="0">
+            <a:schemeClr val="accent1"/>
+          </a:effectRef>
+          <a:fontRef idx="minor">
+            <a:schemeClr val="lt1"/>
+          </a:fontRef>
+        </p:style>
+        <p:txBody>
+          <a:bodyPr rtlCol="0" anchor="ctr"/>
+          <a:lstStyle/>
+          <a:p>
+            <a:endParaRPr lang="en-US" dirty="0">
+              <a:solidFill>
+                <a:srgbClr val="000000"/>
+              </a:solidFill>
+            </a:endParaRPr>
+          </a:p>
+        </p:txBody>
+      </p:sp>
+      <p:sp>
+        <p:nvSpPr>
+          <p:cNvPr id="47" name="Rectangle 46">
+            <a:extLst>
+              <a:ext uri="{FF2B5EF4-FFF2-40B4-BE49-F238E27FC236}">
+                <a16:creationId xmlns:a16="http://schemas.microsoft.com/office/drawing/2014/main" id="{D13E14B6-C5F9-4921-B47A-A713D13FD3B7}"/>
+              </a:ext>
+            </a:extLst>
+          </p:cNvPr>
+          <p:cNvSpPr/>
+          <p:nvPr/>
+        </p:nvSpPr>
+        <p:spPr>
+          <a:xfrm>
+            <a:off x="1295400" y="2209800"/>
+            <a:ext cx="7543800" cy="304800"/>
+          </a:xfrm>
+          <a:prstGeom prst="rect">
+            <a:avLst/>
+          </a:prstGeom>
+          <a:solidFill>
+            <a:srgbClr val="B0C6E1"/>
+          </a:solidFill>
+          <a:ln w="12700">
+            <a:noFill/>
+          </a:ln>
+        </p:spPr>
+        <p:style>
+          <a:lnRef idx="2">
+            <a:schemeClr val="accent1">
+              <a:shade val="50000"/>
+            </a:schemeClr>
+          </a:lnRef>
+          <a:fillRef idx="1">
+            <a:schemeClr val="accent1"/>
+          </a:fillRef>
+          <a:effectRef idx="0">
+            <a:schemeClr val="accent1"/>
+          </a:effectRef>
+          <a:fontRef idx="minor">
+            <a:schemeClr val="lt1"/>
+          </a:fontRef>
+        </p:style>
+        <p:txBody>
+          <a:bodyPr rtlCol="0" anchor="ctr"/>
+          <a:lstStyle/>
+          <a:p>
+            <a:endParaRPr lang="en-US" dirty="0">
+              <a:solidFill>
+                <a:srgbClr val="000000"/>
+              </a:solidFill>
+            </a:endParaRPr>
+          </a:p>
+        </p:txBody>
+      </p:sp>
+      <p:sp>
+        <p:nvSpPr>
+          <p:cNvPr id="48" name="Rectangle 47">
+            <a:extLst>
+              <a:ext uri="{FF2B5EF4-FFF2-40B4-BE49-F238E27FC236}">
+                <a16:creationId xmlns:a16="http://schemas.microsoft.com/office/drawing/2014/main" id="{1E322921-DE60-4BFF-8CC0-986B6AC17011}"/>
+              </a:ext>
+            </a:extLst>
+          </p:cNvPr>
+          <p:cNvSpPr/>
+          <p:nvPr/>
+        </p:nvSpPr>
+        <p:spPr>
+          <a:xfrm>
+            <a:off x="1295400" y="2895600"/>
+            <a:ext cx="7543800" cy="304800"/>
+          </a:xfrm>
+          <a:prstGeom prst="rect">
+            <a:avLst/>
+          </a:prstGeom>
+          <a:solidFill>
+            <a:srgbClr val="B0C6E1"/>
+          </a:solidFill>
+          <a:ln w="12700">
+            <a:noFill/>
+          </a:ln>
+        </p:spPr>
+        <p:style>
+          <a:lnRef idx="2">
+            <a:schemeClr val="accent1">
+              <a:shade val="50000"/>
+            </a:schemeClr>
+          </a:lnRef>
+          <a:fillRef idx="1">
+            <a:schemeClr val="accent1"/>
+          </a:fillRef>
+          <a:effectRef idx="0">
+            <a:schemeClr val="accent1"/>
+          </a:effectRef>
+          <a:fontRef idx="minor">
+            <a:schemeClr val="lt1"/>
+          </a:fontRef>
+        </p:style>
+        <p:txBody>
+          <a:bodyPr rtlCol="0" anchor="ctr"/>
+          <a:lstStyle/>
+          <a:p>
+            <a:endParaRPr lang="en-US" dirty="0">
+              <a:solidFill>
+                <a:srgbClr val="000000"/>
+              </a:solidFill>
+            </a:endParaRPr>
+          </a:p>
+        </p:txBody>
+      </p:sp>
+      <p:sp>
+        <p:nvSpPr>
+          <p:cNvPr id="49" name="Rectangle 48">
+            <a:extLst>
+              <a:ext uri="{FF2B5EF4-FFF2-40B4-BE49-F238E27FC236}">
+                <a16:creationId xmlns:a16="http://schemas.microsoft.com/office/drawing/2014/main" id="{023F9A62-05F9-40BE-AA6B-1C5957F11095}"/>
+              </a:ext>
+            </a:extLst>
+          </p:cNvPr>
+          <p:cNvSpPr/>
+          <p:nvPr/>
+        </p:nvSpPr>
+        <p:spPr>
+          <a:xfrm>
+            <a:off x="1295400" y="3581400"/>
+            <a:ext cx="7543800" cy="304800"/>
+          </a:xfrm>
+          <a:prstGeom prst="rect">
+            <a:avLst/>
+          </a:prstGeom>
+          <a:solidFill>
+            <a:srgbClr val="B0C6E1"/>
+          </a:solidFill>
+          <a:ln w="12700">
+            <a:noFill/>
+          </a:ln>
+        </p:spPr>
+        <p:style>
+          <a:lnRef idx="2">
+            <a:schemeClr val="accent1">
+              <a:shade val="50000"/>
+            </a:schemeClr>
+          </a:lnRef>
+          <a:fillRef idx="1">
+            <a:schemeClr val="accent1"/>
+          </a:fillRef>
+          <a:effectRef idx="0">
+            <a:schemeClr val="accent1"/>
+          </a:effectRef>
+          <a:fontRef idx="minor">
+            <a:schemeClr val="lt1"/>
+          </a:fontRef>
+        </p:style>
+        <p:txBody>
+          <a:bodyPr rtlCol="0" anchor="ctr"/>
+          <a:lstStyle/>
+          <a:p>
+            <a:endParaRPr lang="en-US" dirty="0">
+              <a:solidFill>
+                <a:srgbClr val="000000"/>
+              </a:solidFill>
+            </a:endParaRPr>
+          </a:p>
+        </p:txBody>
+      </p:sp>
+      <p:sp>
+        <p:nvSpPr>
+          <p:cNvPr id="50" name="Rectangle 49">
+            <a:extLst>
+              <a:ext uri="{FF2B5EF4-FFF2-40B4-BE49-F238E27FC236}">
+                <a16:creationId xmlns:a16="http://schemas.microsoft.com/office/drawing/2014/main" id="{52A7FFFF-E53C-403B-B0ED-69F1EC5063D2}"/>
+              </a:ext>
+            </a:extLst>
+          </p:cNvPr>
+          <p:cNvSpPr/>
+          <p:nvPr/>
+        </p:nvSpPr>
+        <p:spPr>
+          <a:xfrm>
+            <a:off x="1295400" y="4267200"/>
+            <a:ext cx="7543800" cy="304800"/>
+          </a:xfrm>
+          <a:prstGeom prst="rect">
+            <a:avLst/>
+          </a:prstGeom>
+          <a:solidFill>
+            <a:srgbClr val="B0C6E1"/>
+          </a:solidFill>
+          <a:ln w="12700">
+            <a:noFill/>
+          </a:ln>
+        </p:spPr>
+        <p:style>
+          <a:lnRef idx="2">
+            <a:schemeClr val="accent1">
+              <a:shade val="50000"/>
+            </a:schemeClr>
+          </a:lnRef>
+          <a:fillRef idx="1">
+            <a:schemeClr val="accent1"/>
+          </a:fillRef>
+          <a:effectRef idx="0">
+            <a:schemeClr val="accent1"/>
+          </a:effectRef>
+          <a:fontRef idx="minor">
+            <a:schemeClr val="lt1"/>
+          </a:fontRef>
+        </p:style>
+        <p:txBody>
+          <a:bodyPr rtlCol="0" anchor="ctr"/>
+          <a:lstStyle/>
+          <a:p>
+            <a:endParaRPr lang="en-US" dirty="0">
+              <a:solidFill>
+                <a:srgbClr val="000000"/>
+              </a:solidFill>
+            </a:endParaRPr>
+          </a:p>
+        </p:txBody>
+      </p:sp>
+      <p:sp>
+        <p:nvSpPr>
+          <p:cNvPr id="51" name="Rectangle 50">
+            <a:extLst>
+              <a:ext uri="{FF2B5EF4-FFF2-40B4-BE49-F238E27FC236}">
+                <a16:creationId xmlns:a16="http://schemas.microsoft.com/office/drawing/2014/main" id="{3BC8B312-6F15-4C38-8B7E-F2588749B397}"/>
+              </a:ext>
+            </a:extLst>
+          </p:cNvPr>
+          <p:cNvSpPr/>
+          <p:nvPr/>
+        </p:nvSpPr>
+        <p:spPr>
+          <a:xfrm>
+            <a:off x="1295400" y="4953000"/>
+            <a:ext cx="7543800" cy="304800"/>
+          </a:xfrm>
+          <a:prstGeom prst="rect">
+            <a:avLst/>
+          </a:prstGeom>
+          <a:solidFill>
+            <a:srgbClr val="B0C6E1"/>
+          </a:solidFill>
+          <a:ln w="12700">
+            <a:noFill/>
+          </a:ln>
+        </p:spPr>
+        <p:style>
+          <a:lnRef idx="2">
+            <a:schemeClr val="accent1">
+              <a:shade val="50000"/>
+            </a:schemeClr>
+          </a:lnRef>
+          <a:fillRef idx="1">
+            <a:schemeClr val="accent1"/>
+          </a:fillRef>
+          <a:effectRef idx="0">
+            <a:schemeClr val="accent1"/>
+          </a:effectRef>
+          <a:fontRef idx="minor">
+            <a:schemeClr val="lt1"/>
+          </a:fontRef>
+        </p:style>
+        <p:txBody>
+          <a:bodyPr rtlCol="0" anchor="ctr"/>
+          <a:lstStyle/>
+          <a:p>
+            <a:endParaRPr lang="en-US" dirty="0">
+              <a:solidFill>
+                <a:srgbClr val="000000"/>
+              </a:solidFill>
+            </a:endParaRPr>
+          </a:p>
+        </p:txBody>
+      </p:sp>
+      <p:sp>
+        <p:nvSpPr>
+          <p:cNvPr id="2" name="Rectangle 1"/>
+          <p:cNvSpPr/>
+          <p:nvPr/>
+        </p:nvSpPr>
+        <p:spPr>
+          <a:xfrm>
+            <a:off x="4495800" y="73460"/>
+            <a:ext cx="762000" cy="5946340"/>
+          </a:xfrm>
+          <a:prstGeom prst="rect">
+            <a:avLst/>
+          </a:prstGeom>
+          <a:solidFill>
+            <a:srgbClr val="C0504D">
+              <a:alpha val="40000"/>
+            </a:srgbClr>
+          </a:solidFill>
+          <a:ln>
+            <a:noFill/>
+          </a:ln>
+        </p:spPr>
+        <p:style>
+          <a:lnRef idx="2">
+            <a:schemeClr val="accent1">
+              <a:shade val="50000"/>
+            </a:schemeClr>
+          </a:lnRef>
+          <a:fillRef idx="1">
+            <a:schemeClr val="accent1"/>
+          </a:fillRef>
+          <a:effectRef idx="0">
+            <a:schemeClr val="accent1"/>
+          </a:effectRef>
+          <a:fontRef idx="minor">
+            <a:schemeClr val="lt1"/>
+          </a:fontRef>
+        </p:style>
+        <p:txBody>
+          <a:bodyPr vert="vert" rtlCol="0" anchor="ctr"/>
+          <a:lstStyle/>
+          <a:p>
+            <a:endParaRPr lang="en-US" dirty="0">
+              <a:solidFill>
+                <a:schemeClr val="tx1"/>
+              </a:solidFill>
+            </a:endParaRPr>
+          </a:p>
+        </p:txBody>
+      </p:sp>
+      <p:sp>
+        <p:nvSpPr>
+          <p:cNvPr id="54" name="Rectangle 53"/>
+          <p:cNvSpPr/>
+          <p:nvPr/>
+        </p:nvSpPr>
+        <p:spPr>
+          <a:xfrm>
+            <a:off x="5638800" y="73460"/>
+            <a:ext cx="762000" cy="5946340"/>
+          </a:xfrm>
+          <a:prstGeom prst="rect">
+            <a:avLst/>
+          </a:prstGeom>
+          <a:solidFill>
+            <a:srgbClr val="C0504D">
+              <a:alpha val="40000"/>
+            </a:srgbClr>
+          </a:solidFill>
+          <a:ln>
+            <a:noFill/>
+          </a:ln>
+        </p:spPr>
+        <p:style>
+          <a:lnRef idx="2">
+            <a:schemeClr val="accent1">
+              <a:shade val="50000"/>
+            </a:schemeClr>
+          </a:lnRef>
+          <a:fillRef idx="1">
+            <a:schemeClr val="accent1"/>
+          </a:fillRef>
+          <a:effectRef idx="0">
+            <a:schemeClr val="accent1"/>
+          </a:effectRef>
+          <a:fontRef idx="minor">
+            <a:schemeClr val="lt1"/>
+          </a:fontRef>
+        </p:style>
+        <p:txBody>
+          <a:bodyPr vert="vert" rtlCol="0" anchor="ctr"/>
+          <a:lstStyle/>
+          <a:p>
+            <a:endParaRPr lang="en-US" dirty="0">
+              <a:solidFill>
+                <a:schemeClr val="tx1"/>
+              </a:solidFill>
+            </a:endParaRPr>
+          </a:p>
+        </p:txBody>
+      </p:sp>
+      <p:sp>
+        <p:nvSpPr>
+          <p:cNvPr id="56" name="Rectangle 55"/>
+          <p:cNvSpPr/>
+          <p:nvPr/>
+        </p:nvSpPr>
+        <p:spPr>
+          <a:xfrm>
+            <a:off x="7924800" y="73460"/>
+            <a:ext cx="761999" cy="5946340"/>
+          </a:xfrm>
+          <a:prstGeom prst="rect">
+            <a:avLst/>
+          </a:prstGeom>
+          <a:solidFill>
+            <a:srgbClr val="C0504D">
+              <a:alpha val="40000"/>
+            </a:srgbClr>
+          </a:solidFill>
+          <a:ln>
+            <a:noFill/>
+          </a:ln>
+        </p:spPr>
+        <p:style>
+          <a:lnRef idx="2">
+            <a:schemeClr val="accent1">
+              <a:shade val="50000"/>
+            </a:schemeClr>
+          </a:lnRef>
+          <a:fillRef idx="1">
+            <a:schemeClr val="accent1"/>
+          </a:fillRef>
+          <a:effectRef idx="0">
+            <a:schemeClr val="accent1"/>
+          </a:effectRef>
+          <a:fontRef idx="minor">
+            <a:schemeClr val="lt1"/>
+          </a:fontRef>
+        </p:style>
+        <p:txBody>
+          <a:bodyPr vert="vert" rtlCol="0" anchor="ctr"/>
+          <a:lstStyle/>
+          <a:p>
+            <a:endParaRPr lang="en-US" dirty="0">
+              <a:solidFill>
+                <a:schemeClr val="tx1"/>
+              </a:solidFill>
+            </a:endParaRPr>
+          </a:p>
+        </p:txBody>
+      </p:sp>
+      <p:sp>
+        <p:nvSpPr>
+          <p:cNvPr id="58" name="Rectangle 57"/>
+          <p:cNvSpPr/>
+          <p:nvPr/>
+        </p:nvSpPr>
+        <p:spPr>
+          <a:xfrm>
+            <a:off x="6781800" y="73460"/>
+            <a:ext cx="761999" cy="5946340"/>
+          </a:xfrm>
+          <a:prstGeom prst="rect">
+            <a:avLst/>
+          </a:prstGeom>
+          <a:solidFill>
+            <a:srgbClr val="C0504D">
+              <a:alpha val="40000"/>
+            </a:srgbClr>
+          </a:solidFill>
+          <a:ln>
+            <a:noFill/>
+          </a:ln>
+        </p:spPr>
+        <p:style>
+          <a:lnRef idx="2">
+            <a:schemeClr val="accent1">
+              <a:shade val="50000"/>
+            </a:schemeClr>
+          </a:lnRef>
+          <a:fillRef idx="1">
+            <a:schemeClr val="accent1"/>
+          </a:fillRef>
+          <a:effectRef idx="0">
+            <a:schemeClr val="accent1"/>
+          </a:effectRef>
+          <a:fontRef idx="minor">
+            <a:schemeClr val="lt1"/>
+          </a:fontRef>
+        </p:style>
+        <p:txBody>
+          <a:bodyPr vert="vert" rtlCol="0" anchor="ctr"/>
+          <a:lstStyle/>
+          <a:p>
+            <a:endParaRPr lang="en-US" dirty="0">
+              <a:solidFill>
+                <a:schemeClr val="tx1"/>
+              </a:solidFill>
+            </a:endParaRPr>
+          </a:p>
+        </p:txBody>
+      </p:sp>
+      <p:sp>
+        <p:nvSpPr>
+          <p:cNvPr id="19" name="Rounded Rectangle 20">
+            <a:extLst>
+              <a:ext uri="{FF2B5EF4-FFF2-40B4-BE49-F238E27FC236}">
+                <a16:creationId xmlns:a16="http://schemas.microsoft.com/office/drawing/2014/main" id="{8A55AFB8-C747-48A5-997F-C69D5A31D7EF}"/>
+              </a:ext>
+            </a:extLst>
+          </p:cNvPr>
+          <p:cNvSpPr/>
+          <p:nvPr/>
+        </p:nvSpPr>
+        <p:spPr>
+          <a:xfrm>
+            <a:off x="7772400" y="1371600"/>
+            <a:ext cx="1066800" cy="1981200"/>
+          </a:xfrm>
+          <a:prstGeom prst="roundRect">
+            <a:avLst/>
+          </a:prstGeom>
+          <a:solidFill>
+            <a:schemeClr val="accent2">
+              <a:lumMod val="75000"/>
+            </a:schemeClr>
+          </a:solidFill>
+          <a:ln w="12700">
+            <a:solidFill>
+              <a:schemeClr val="tx1"/>
+            </a:solidFill>
+          </a:ln>
+        </p:spPr>
+        <p:style>
+          <a:lnRef idx="2">
+            <a:schemeClr val="accent1">
+              <a:shade val="50000"/>
+            </a:schemeClr>
+          </a:lnRef>
+          <a:fillRef idx="1">
+            <a:schemeClr val="accent1"/>
+          </a:fillRef>
+          <a:effectRef idx="0">
+            <a:schemeClr val="accent1"/>
+          </a:effectRef>
+          <a:fontRef idx="minor">
+            <a:schemeClr val="lt1"/>
+          </a:fontRef>
+        </p:style>
+        <p:txBody>
+          <a:bodyPr wrap="square" lIns="45720" tIns="0" rIns="9144" bIns="0" rtlCol="0" anchor="b" anchorCtr="0"/>
+          <a:lstStyle/>
+          <a:p>
+            <a:endParaRPr lang="en-US" sz="1400" dirty="0">
+              <a:solidFill>
+                <a:schemeClr val="tx1"/>
+              </a:solidFill>
+            </a:endParaRPr>
+          </a:p>
+        </p:txBody>
+      </p:sp>
+    </p:spTree>
+    <p:extLst>
+      <p:ext uri="{BB962C8B-B14F-4D97-AF65-F5344CB8AC3E}">
+        <p14:creationId xmlns:p14="http://schemas.microsoft.com/office/powerpoint/2010/main" val="4222305945"/>
       </p:ext>
     </p:extLst>
   </p:cSld>

</xml_diff>